<commit_message>
10.24.21 updated - dmm
</commit_message>
<xml_diff>
--- a/Class Project/Class Project - DMM.pptx
+++ b/Class Project/Class Project - DMM.pptx
@@ -11,11 +11,11 @@
   <p:sldIdLst>
     <p:sldId id="256" r:id="rId3"/>
     <p:sldId id="257" r:id="rId4"/>
-    <p:sldId id="258" r:id="rId5"/>
-    <p:sldId id="259" r:id="rId6"/>
-    <p:sldId id="260" r:id="rId7"/>
-    <p:sldId id="261" r:id="rId8"/>
-    <p:sldId id="262" r:id="rId9"/>
+    <p:sldId id="259" r:id="rId5"/>
+    <p:sldId id="260" r:id="rId6"/>
+    <p:sldId id="262" r:id="rId7"/>
+    <p:sldId id="258" r:id="rId8"/>
+    <p:sldId id="261" r:id="rId9"/>
   </p:sldIdLst>
   <p:sldSz cx="12192000" cy="6858000"/>
   <p:notesSz cx="6858000" cy="9144000"/>
@@ -279,29 +279,60 @@
 </p:presentation>
 </file>
 
+<file path=ppt/revisionInfo.xml><?xml version="1.0" encoding="utf-8"?>
+<p1510:revInfo xmlns:a="http://schemas.openxmlformats.org/drawingml/2006/main" xmlns:r="http://schemas.openxmlformats.org/officeDocument/2006/relationships" xmlns:p1510="http://schemas.microsoft.com/office/powerpoint/2015/10/main">
+  <p1510:revLst>
+    <p1510:client id="{57D52DE8-3E0F-4887-9040-D95A313F4ED3}" v="13" dt="2021-10-24T16:00:27.540"/>
+  </p1510:revLst>
+</p1510:revInfo>
+</file>
+
 <file path=ppt/changesInfos/changesInfo1.xml><?xml version="1.0" encoding="utf-8"?>
 <pc:chgInfo xmlns:a="http://schemas.openxmlformats.org/drawingml/2006/main" xmlns:r="http://schemas.openxmlformats.org/officeDocument/2006/relationships" xmlns:ac="http://schemas.microsoft.com/office/drawing/2013/main/command" xmlns:pc="http://schemas.microsoft.com/office/powerpoint/2013/main/command">
   <pc:docChgLst>
     <pc:chgData name="Jeremy Bergmann" userId="2355ee0d-2b6e-4bfe-a235-383daf8df8e3" providerId="ADAL" clId="{57D52DE8-3E0F-4887-9040-D95A313F4ED3}"/>
-    <pc:docChg chg="modSld">
-      <pc:chgData name="Jeremy Bergmann" userId="2355ee0d-2b6e-4bfe-a235-383daf8df8e3" providerId="ADAL" clId="{57D52DE8-3E0F-4887-9040-D95A313F4ED3}" dt="2021-10-20T18:41:17.935" v="8" actId="20577"/>
+    <pc:docChg chg="undo custSel modSld sldOrd">
+      <pc:chgData name="Jeremy Bergmann" userId="2355ee0d-2b6e-4bfe-a235-383daf8df8e3" providerId="ADAL" clId="{57D52DE8-3E0F-4887-9040-D95A313F4ED3}" dt="2021-10-24T18:09:44.270" v="417"/>
       <pc:docMkLst>
         <pc:docMk/>
       </pc:docMkLst>
-      <pc:sldChg chg="modSp mod">
-        <pc:chgData name="Jeremy Bergmann" userId="2355ee0d-2b6e-4bfe-a235-383daf8df8e3" providerId="ADAL" clId="{57D52DE8-3E0F-4887-9040-D95A313F4ED3}" dt="2021-10-20T18:41:17.935" v="8" actId="20577"/>
+      <pc:sldChg chg="modSp mod ord">
+        <pc:chgData name="Jeremy Bergmann" userId="2355ee0d-2b6e-4bfe-a235-383daf8df8e3" providerId="ADAL" clId="{57D52DE8-3E0F-4887-9040-D95A313F4ED3}" dt="2021-10-24T18:09:40.572" v="415"/>
         <pc:sldMkLst>
           <pc:docMk/>
           <pc:sldMk cId="0" sldId="258"/>
         </pc:sldMkLst>
         <pc:spChg chg="mod">
-          <ac:chgData name="Jeremy Bergmann" userId="2355ee0d-2b6e-4bfe-a235-383daf8df8e3" providerId="ADAL" clId="{57D52DE8-3E0F-4887-9040-D95A313F4ED3}" dt="2021-10-20T18:41:17.935" v="8" actId="20577"/>
+          <ac:chgData name="Jeremy Bergmann" userId="2355ee0d-2b6e-4bfe-a235-383daf8df8e3" providerId="ADAL" clId="{57D52DE8-3E0F-4887-9040-D95A313F4ED3}" dt="2021-10-24T17:07:57.801" v="413" actId="20577"/>
           <ac:spMkLst>
             <pc:docMk/>
             <pc:sldMk cId="0" sldId="258"/>
             <ac:spMk id="192" creationId="{00000000-0000-0000-0000-000000000000}"/>
           </ac:spMkLst>
         </pc:spChg>
+      </pc:sldChg>
+      <pc:sldChg chg="addSp delSp modSp mod ord">
+        <pc:chgData name="Jeremy Bergmann" userId="2355ee0d-2b6e-4bfe-a235-383daf8df8e3" providerId="ADAL" clId="{57D52DE8-3E0F-4887-9040-D95A313F4ED3}" dt="2021-10-24T18:09:44.270" v="417"/>
+        <pc:sldMkLst>
+          <pc:docMk/>
+          <pc:sldMk cId="0" sldId="261"/>
+        </pc:sldMkLst>
+        <pc:graphicFrameChg chg="add mod modGraphic">
+          <ac:chgData name="Jeremy Bergmann" userId="2355ee0d-2b6e-4bfe-a235-383daf8df8e3" providerId="ADAL" clId="{57D52DE8-3E0F-4887-9040-D95A313F4ED3}" dt="2021-10-24T16:03:15.519" v="411" actId="20577"/>
+          <ac:graphicFrameMkLst>
+            <pc:docMk/>
+            <pc:sldMk cId="0" sldId="261"/>
+            <ac:graphicFrameMk id="4" creationId="{AD3F470C-FD5D-4AD3-9B5A-F2EA7F86CBD1}"/>
+          </ac:graphicFrameMkLst>
+        </pc:graphicFrameChg>
+        <pc:graphicFrameChg chg="del mod modGraphic">
+          <ac:chgData name="Jeremy Bergmann" userId="2355ee0d-2b6e-4bfe-a235-383daf8df8e3" providerId="ADAL" clId="{57D52DE8-3E0F-4887-9040-D95A313F4ED3}" dt="2021-10-24T16:00:35.969" v="301" actId="478"/>
+          <ac:graphicFrameMkLst>
+            <pc:docMk/>
+            <pc:sldMk cId="0" sldId="261"/>
+            <ac:graphicFrameMk id="210" creationId="{00000000-0000-0000-0000-000000000000}"/>
+          </ac:graphicFrameMkLst>
+        </pc:graphicFrameChg>
       </pc:sldChg>
     </pc:docChg>
   </pc:docChgLst>
@@ -1714,6 +1745,318 @@
   <p:cSld>
     <p:spTree>
       <p:nvGrpSpPr>
+        <p:cNvPr id="1" name="Shape 193"/>
+        <p:cNvGrpSpPr/>
+        <p:nvPr/>
+      </p:nvGrpSpPr>
+      <p:grpSpPr>
+        <a:xfrm>
+          <a:off x="0" y="0"/>
+          <a:ext cx="0" cy="0"/>
+          <a:chOff x="0" y="0"/>
+          <a:chExt cx="0" cy="0"/>
+        </a:xfrm>
+      </p:grpSpPr>
+      <p:sp>
+        <p:nvSpPr>
+          <p:cNvPr id="194" name="Google Shape;194;g4fe6ed41a2_0_427:notes"/>
+          <p:cNvSpPr txBox="1">
+            <a:spLocks noGrp="1"/>
+          </p:cNvSpPr>
+          <p:nvPr>
+            <p:ph type="body" idx="1"/>
+          </p:nvPr>
+        </p:nvSpPr>
+        <p:spPr>
+          <a:xfrm>
+            <a:off x="685800" y="4400550"/>
+            <a:ext cx="5486400" cy="3600600"/>
+          </a:xfrm>
+          <a:prstGeom prst="rect">
+            <a:avLst/>
+          </a:prstGeom>
+        </p:spPr>
+        <p:txBody>
+          <a:bodyPr spcFirstLastPara="1" wrap="square" lIns="91425" tIns="45700" rIns="91425" bIns="45700" anchor="t" anchorCtr="0">
+            <a:noAutofit/>
+          </a:bodyPr>
+          <a:lstStyle/>
+          <a:p>
+            <a:pPr marL="0" lvl="0" indent="0" algn="l" rtl="0">
+              <a:spcBef>
+                <a:spcPts val="0"/>
+              </a:spcBef>
+              <a:spcAft>
+                <a:spcPts val="0"/>
+              </a:spcAft>
+              <a:buNone/>
+            </a:pPr>
+            <a:endParaRPr/>
+          </a:p>
+        </p:txBody>
+      </p:sp>
+      <p:sp>
+        <p:nvSpPr>
+          <p:cNvPr id="195" name="Google Shape;195;g4fe6ed41a2_0_427:notes"/>
+          <p:cNvSpPr>
+            <a:spLocks noGrp="1" noRot="1" noChangeAspect="1"/>
+          </p:cNvSpPr>
+          <p:nvPr>
+            <p:ph type="sldImg" idx="2"/>
+          </p:nvPr>
+        </p:nvSpPr>
+        <p:spPr>
+          <a:xfrm>
+            <a:off x="685800" y="1143000"/>
+            <a:ext cx="5486400" cy="3086100"/>
+          </a:xfrm>
+          <a:custGeom>
+            <a:avLst/>
+            <a:gdLst/>
+            <a:ahLst/>
+            <a:cxnLst/>
+            <a:rect l="l" t="t" r="r" b="b"/>
+            <a:pathLst>
+              <a:path w="120000" h="120000" extrusionOk="0">
+                <a:moveTo>
+                  <a:pt x="0" y="0"/>
+                </a:moveTo>
+                <a:lnTo>
+                  <a:pt x="120000" y="0"/>
+                </a:lnTo>
+                <a:lnTo>
+                  <a:pt x="120000" y="120000"/>
+                </a:lnTo>
+                <a:lnTo>
+                  <a:pt x="0" y="120000"/>
+                </a:lnTo>
+                <a:close/>
+              </a:path>
+            </a:pathLst>
+          </a:custGeom>
+        </p:spPr>
+      </p:sp>
+    </p:spTree>
+  </p:cSld>
+  <p:clrMapOvr>
+    <a:masterClrMapping/>
+  </p:clrMapOvr>
+</p:notes>
+</file>
+
+<file path=ppt/notesSlides/notesSlide4.xml><?xml version="1.0" encoding="utf-8"?>
+<p:notes xmlns:a="http://schemas.openxmlformats.org/drawingml/2006/main" xmlns:r="http://schemas.openxmlformats.org/officeDocument/2006/relationships" xmlns:p="http://schemas.openxmlformats.org/presentationml/2006/main" showMasterSp="0" showMasterPhAnim="0">
+  <p:cSld>
+    <p:spTree>
+      <p:nvGrpSpPr>
+        <p:cNvPr id="1" name="Shape 199"/>
+        <p:cNvGrpSpPr/>
+        <p:nvPr/>
+      </p:nvGrpSpPr>
+      <p:grpSpPr>
+        <a:xfrm>
+          <a:off x="0" y="0"/>
+          <a:ext cx="0" cy="0"/>
+          <a:chOff x="0" y="0"/>
+          <a:chExt cx="0" cy="0"/>
+        </a:xfrm>
+      </p:grpSpPr>
+      <p:sp>
+        <p:nvSpPr>
+          <p:cNvPr id="200" name="Google Shape;200;g4fe6ed41a2_0_435:notes"/>
+          <p:cNvSpPr txBox="1">
+            <a:spLocks noGrp="1"/>
+          </p:cNvSpPr>
+          <p:nvPr>
+            <p:ph type="body" idx="1"/>
+          </p:nvPr>
+        </p:nvSpPr>
+        <p:spPr>
+          <a:xfrm>
+            <a:off x="685800" y="4400550"/>
+            <a:ext cx="5486400" cy="3600600"/>
+          </a:xfrm>
+          <a:prstGeom prst="rect">
+            <a:avLst/>
+          </a:prstGeom>
+        </p:spPr>
+        <p:txBody>
+          <a:bodyPr spcFirstLastPara="1" wrap="square" lIns="91425" tIns="45700" rIns="91425" bIns="45700" anchor="t" anchorCtr="0">
+            <a:noAutofit/>
+          </a:bodyPr>
+          <a:lstStyle/>
+          <a:p>
+            <a:pPr marL="0" lvl="0" indent="0" algn="l" rtl="0">
+              <a:spcBef>
+                <a:spcPts val="0"/>
+              </a:spcBef>
+              <a:spcAft>
+                <a:spcPts val="0"/>
+              </a:spcAft>
+              <a:buNone/>
+            </a:pPr>
+            <a:endParaRPr/>
+          </a:p>
+        </p:txBody>
+      </p:sp>
+      <p:sp>
+        <p:nvSpPr>
+          <p:cNvPr id="201" name="Google Shape;201;g4fe6ed41a2_0_435:notes"/>
+          <p:cNvSpPr>
+            <a:spLocks noGrp="1" noRot="1" noChangeAspect="1"/>
+          </p:cNvSpPr>
+          <p:nvPr>
+            <p:ph type="sldImg" idx="2"/>
+          </p:nvPr>
+        </p:nvSpPr>
+        <p:spPr>
+          <a:xfrm>
+            <a:off x="685800" y="1143000"/>
+            <a:ext cx="5486400" cy="3086100"/>
+          </a:xfrm>
+          <a:custGeom>
+            <a:avLst/>
+            <a:gdLst/>
+            <a:ahLst/>
+            <a:cxnLst/>
+            <a:rect l="l" t="t" r="r" b="b"/>
+            <a:pathLst>
+              <a:path w="120000" h="120000" extrusionOk="0">
+                <a:moveTo>
+                  <a:pt x="0" y="0"/>
+                </a:moveTo>
+                <a:lnTo>
+                  <a:pt x="120000" y="0"/>
+                </a:lnTo>
+                <a:lnTo>
+                  <a:pt x="120000" y="120000"/>
+                </a:lnTo>
+                <a:lnTo>
+                  <a:pt x="0" y="120000"/>
+                </a:lnTo>
+                <a:close/>
+              </a:path>
+            </a:pathLst>
+          </a:custGeom>
+        </p:spPr>
+      </p:sp>
+    </p:spTree>
+  </p:cSld>
+  <p:clrMapOvr>
+    <a:masterClrMapping/>
+  </p:clrMapOvr>
+</p:notes>
+</file>
+
+<file path=ppt/notesSlides/notesSlide5.xml><?xml version="1.0" encoding="utf-8"?>
+<p:notes xmlns:a="http://schemas.openxmlformats.org/drawingml/2006/main" xmlns:r="http://schemas.openxmlformats.org/officeDocument/2006/relationships" xmlns:p="http://schemas.openxmlformats.org/presentationml/2006/main" showMasterSp="0" showMasterPhAnim="0">
+  <p:cSld>
+    <p:spTree>
+      <p:nvGrpSpPr>
+        <p:cNvPr id="1" name="Shape 211"/>
+        <p:cNvGrpSpPr/>
+        <p:nvPr/>
+      </p:nvGrpSpPr>
+      <p:grpSpPr>
+        <a:xfrm>
+          <a:off x="0" y="0"/>
+          <a:ext cx="0" cy="0"/>
+          <a:chOff x="0" y="0"/>
+          <a:chExt cx="0" cy="0"/>
+        </a:xfrm>
+      </p:grpSpPr>
+      <p:sp>
+        <p:nvSpPr>
+          <p:cNvPr id="212" name="Google Shape;212;g5d1d395c52_2_90:notes"/>
+          <p:cNvSpPr txBox="1">
+            <a:spLocks noGrp="1"/>
+          </p:cNvSpPr>
+          <p:nvPr>
+            <p:ph type="body" idx="1"/>
+          </p:nvPr>
+        </p:nvSpPr>
+        <p:spPr>
+          <a:xfrm>
+            <a:off x="685800" y="4400550"/>
+            <a:ext cx="5486400" cy="3600600"/>
+          </a:xfrm>
+          <a:prstGeom prst="rect">
+            <a:avLst/>
+          </a:prstGeom>
+        </p:spPr>
+        <p:txBody>
+          <a:bodyPr spcFirstLastPara="1" wrap="square" lIns="91425" tIns="45700" rIns="91425" bIns="45700" anchor="t" anchorCtr="0">
+            <a:noAutofit/>
+          </a:bodyPr>
+          <a:lstStyle/>
+          <a:p>
+            <a:pPr marL="0" lvl="0" indent="0" algn="l" rtl="0">
+              <a:spcBef>
+                <a:spcPts val="0"/>
+              </a:spcBef>
+              <a:spcAft>
+                <a:spcPts val="0"/>
+              </a:spcAft>
+              <a:buNone/>
+            </a:pPr>
+            <a:endParaRPr/>
+          </a:p>
+        </p:txBody>
+      </p:sp>
+      <p:sp>
+        <p:nvSpPr>
+          <p:cNvPr id="213" name="Google Shape;213;g5d1d395c52_2_90:notes"/>
+          <p:cNvSpPr>
+            <a:spLocks noGrp="1" noRot="1" noChangeAspect="1"/>
+          </p:cNvSpPr>
+          <p:nvPr>
+            <p:ph type="sldImg" idx="2"/>
+          </p:nvPr>
+        </p:nvSpPr>
+        <p:spPr>
+          <a:xfrm>
+            <a:off x="685800" y="1143000"/>
+            <a:ext cx="5486400" cy="3086100"/>
+          </a:xfrm>
+          <a:custGeom>
+            <a:avLst/>
+            <a:gdLst/>
+            <a:ahLst/>
+            <a:cxnLst/>
+            <a:rect l="l" t="t" r="r" b="b"/>
+            <a:pathLst>
+              <a:path w="120000" h="120000" extrusionOk="0">
+                <a:moveTo>
+                  <a:pt x="0" y="0"/>
+                </a:moveTo>
+                <a:lnTo>
+                  <a:pt x="120000" y="0"/>
+                </a:lnTo>
+                <a:lnTo>
+                  <a:pt x="120000" y="120000"/>
+                </a:lnTo>
+                <a:lnTo>
+                  <a:pt x="0" y="120000"/>
+                </a:lnTo>
+                <a:close/>
+              </a:path>
+            </a:pathLst>
+          </a:custGeom>
+        </p:spPr>
+      </p:sp>
+    </p:spTree>
+  </p:cSld>
+  <p:clrMapOvr>
+    <a:masterClrMapping/>
+  </p:clrMapOvr>
+</p:notes>
+</file>
+
+<file path=ppt/notesSlides/notesSlide6.xml><?xml version="1.0" encoding="utf-8"?>
+<p:notes xmlns:a="http://schemas.openxmlformats.org/drawingml/2006/main" xmlns:r="http://schemas.openxmlformats.org/officeDocument/2006/relationships" xmlns:p="http://schemas.openxmlformats.org/presentationml/2006/main" showMasterSp="0" showMasterPhAnim="0">
+  <p:cSld>
+    <p:spTree>
+      <p:nvGrpSpPr>
         <p:cNvPr id="1" name="Shape 187"/>
         <p:cNvGrpSpPr/>
         <p:nvPr/>
@@ -1831,215 +2174,7 @@
 </p:notes>
 </file>
 
-<file path=ppt/notesSlides/notesSlide4.xml><?xml version="1.0" encoding="utf-8"?>
-<p:notes xmlns:a="http://schemas.openxmlformats.org/drawingml/2006/main" xmlns:r="http://schemas.openxmlformats.org/officeDocument/2006/relationships" xmlns:p="http://schemas.openxmlformats.org/presentationml/2006/main" showMasterSp="0" showMasterPhAnim="0">
-  <p:cSld>
-    <p:spTree>
-      <p:nvGrpSpPr>
-        <p:cNvPr id="1" name="Shape 193"/>
-        <p:cNvGrpSpPr/>
-        <p:nvPr/>
-      </p:nvGrpSpPr>
-      <p:grpSpPr>
-        <a:xfrm>
-          <a:off x="0" y="0"/>
-          <a:ext cx="0" cy="0"/>
-          <a:chOff x="0" y="0"/>
-          <a:chExt cx="0" cy="0"/>
-        </a:xfrm>
-      </p:grpSpPr>
-      <p:sp>
-        <p:nvSpPr>
-          <p:cNvPr id="194" name="Google Shape;194;g4fe6ed41a2_0_427:notes"/>
-          <p:cNvSpPr txBox="1">
-            <a:spLocks noGrp="1"/>
-          </p:cNvSpPr>
-          <p:nvPr>
-            <p:ph type="body" idx="1"/>
-          </p:nvPr>
-        </p:nvSpPr>
-        <p:spPr>
-          <a:xfrm>
-            <a:off x="685800" y="4400550"/>
-            <a:ext cx="5486400" cy="3600600"/>
-          </a:xfrm>
-          <a:prstGeom prst="rect">
-            <a:avLst/>
-          </a:prstGeom>
-        </p:spPr>
-        <p:txBody>
-          <a:bodyPr spcFirstLastPara="1" wrap="square" lIns="91425" tIns="45700" rIns="91425" bIns="45700" anchor="t" anchorCtr="0">
-            <a:noAutofit/>
-          </a:bodyPr>
-          <a:lstStyle/>
-          <a:p>
-            <a:pPr marL="0" lvl="0" indent="0" algn="l" rtl="0">
-              <a:spcBef>
-                <a:spcPts val="0"/>
-              </a:spcBef>
-              <a:spcAft>
-                <a:spcPts val="0"/>
-              </a:spcAft>
-              <a:buNone/>
-            </a:pPr>
-            <a:endParaRPr/>
-          </a:p>
-        </p:txBody>
-      </p:sp>
-      <p:sp>
-        <p:nvSpPr>
-          <p:cNvPr id="195" name="Google Shape;195;g4fe6ed41a2_0_427:notes"/>
-          <p:cNvSpPr>
-            <a:spLocks noGrp="1" noRot="1" noChangeAspect="1"/>
-          </p:cNvSpPr>
-          <p:nvPr>
-            <p:ph type="sldImg" idx="2"/>
-          </p:nvPr>
-        </p:nvSpPr>
-        <p:spPr>
-          <a:xfrm>
-            <a:off x="685800" y="1143000"/>
-            <a:ext cx="5486400" cy="3086100"/>
-          </a:xfrm>
-          <a:custGeom>
-            <a:avLst/>
-            <a:gdLst/>
-            <a:ahLst/>
-            <a:cxnLst/>
-            <a:rect l="l" t="t" r="r" b="b"/>
-            <a:pathLst>
-              <a:path w="120000" h="120000" extrusionOk="0">
-                <a:moveTo>
-                  <a:pt x="0" y="0"/>
-                </a:moveTo>
-                <a:lnTo>
-                  <a:pt x="120000" y="0"/>
-                </a:lnTo>
-                <a:lnTo>
-                  <a:pt x="120000" y="120000"/>
-                </a:lnTo>
-                <a:lnTo>
-                  <a:pt x="0" y="120000"/>
-                </a:lnTo>
-                <a:close/>
-              </a:path>
-            </a:pathLst>
-          </a:custGeom>
-        </p:spPr>
-      </p:sp>
-    </p:spTree>
-  </p:cSld>
-  <p:clrMapOvr>
-    <a:masterClrMapping/>
-  </p:clrMapOvr>
-</p:notes>
-</file>
-
-<file path=ppt/notesSlides/notesSlide5.xml><?xml version="1.0" encoding="utf-8"?>
-<p:notes xmlns:a="http://schemas.openxmlformats.org/drawingml/2006/main" xmlns:r="http://schemas.openxmlformats.org/officeDocument/2006/relationships" xmlns:p="http://schemas.openxmlformats.org/presentationml/2006/main" showMasterSp="0" showMasterPhAnim="0">
-  <p:cSld>
-    <p:spTree>
-      <p:nvGrpSpPr>
-        <p:cNvPr id="1" name="Shape 199"/>
-        <p:cNvGrpSpPr/>
-        <p:nvPr/>
-      </p:nvGrpSpPr>
-      <p:grpSpPr>
-        <a:xfrm>
-          <a:off x="0" y="0"/>
-          <a:ext cx="0" cy="0"/>
-          <a:chOff x="0" y="0"/>
-          <a:chExt cx="0" cy="0"/>
-        </a:xfrm>
-      </p:grpSpPr>
-      <p:sp>
-        <p:nvSpPr>
-          <p:cNvPr id="200" name="Google Shape;200;g4fe6ed41a2_0_435:notes"/>
-          <p:cNvSpPr txBox="1">
-            <a:spLocks noGrp="1"/>
-          </p:cNvSpPr>
-          <p:nvPr>
-            <p:ph type="body" idx="1"/>
-          </p:nvPr>
-        </p:nvSpPr>
-        <p:spPr>
-          <a:xfrm>
-            <a:off x="685800" y="4400550"/>
-            <a:ext cx="5486400" cy="3600600"/>
-          </a:xfrm>
-          <a:prstGeom prst="rect">
-            <a:avLst/>
-          </a:prstGeom>
-        </p:spPr>
-        <p:txBody>
-          <a:bodyPr spcFirstLastPara="1" wrap="square" lIns="91425" tIns="45700" rIns="91425" bIns="45700" anchor="t" anchorCtr="0">
-            <a:noAutofit/>
-          </a:bodyPr>
-          <a:lstStyle/>
-          <a:p>
-            <a:pPr marL="0" lvl="0" indent="0" algn="l" rtl="0">
-              <a:spcBef>
-                <a:spcPts val="0"/>
-              </a:spcBef>
-              <a:spcAft>
-                <a:spcPts val="0"/>
-              </a:spcAft>
-              <a:buNone/>
-            </a:pPr>
-            <a:endParaRPr/>
-          </a:p>
-        </p:txBody>
-      </p:sp>
-      <p:sp>
-        <p:nvSpPr>
-          <p:cNvPr id="201" name="Google Shape;201;g4fe6ed41a2_0_435:notes"/>
-          <p:cNvSpPr>
-            <a:spLocks noGrp="1" noRot="1" noChangeAspect="1"/>
-          </p:cNvSpPr>
-          <p:nvPr>
-            <p:ph type="sldImg" idx="2"/>
-          </p:nvPr>
-        </p:nvSpPr>
-        <p:spPr>
-          <a:xfrm>
-            <a:off x="685800" y="1143000"/>
-            <a:ext cx="5486400" cy="3086100"/>
-          </a:xfrm>
-          <a:custGeom>
-            <a:avLst/>
-            <a:gdLst/>
-            <a:ahLst/>
-            <a:cxnLst/>
-            <a:rect l="l" t="t" r="r" b="b"/>
-            <a:pathLst>
-              <a:path w="120000" h="120000" extrusionOk="0">
-                <a:moveTo>
-                  <a:pt x="0" y="0"/>
-                </a:moveTo>
-                <a:lnTo>
-                  <a:pt x="120000" y="0"/>
-                </a:lnTo>
-                <a:lnTo>
-                  <a:pt x="120000" y="120000"/>
-                </a:lnTo>
-                <a:lnTo>
-                  <a:pt x="0" y="120000"/>
-                </a:lnTo>
-                <a:close/>
-              </a:path>
-            </a:pathLst>
-          </a:custGeom>
-        </p:spPr>
-      </p:sp>
-    </p:spTree>
-  </p:cSld>
-  <p:clrMapOvr>
-    <a:masterClrMapping/>
-  </p:clrMapOvr>
-</p:notes>
-</file>
-
-<file path=ppt/notesSlides/notesSlide6.xml><?xml version="1.0" encoding="utf-8"?>
+<file path=ppt/notesSlides/notesSlide7.xml><?xml version="1.0" encoding="utf-8"?>
 <p:notes xmlns:a="http://schemas.openxmlformats.org/drawingml/2006/main" xmlns:r="http://schemas.openxmlformats.org/officeDocument/2006/relationships" xmlns:p="http://schemas.openxmlformats.org/presentationml/2006/main" showMasterSp="0" showMasterPhAnim="0">
   <p:cSld>
     <p:spTree>
@@ -2097,110 +2232,6 @@
       <p:sp>
         <p:nvSpPr>
           <p:cNvPr id="207" name="Google Shape;207;g4fe6ed41a2_0_447:notes"/>
-          <p:cNvSpPr>
-            <a:spLocks noGrp="1" noRot="1" noChangeAspect="1"/>
-          </p:cNvSpPr>
-          <p:nvPr>
-            <p:ph type="sldImg" idx="2"/>
-          </p:nvPr>
-        </p:nvSpPr>
-        <p:spPr>
-          <a:xfrm>
-            <a:off x="685800" y="1143000"/>
-            <a:ext cx="5486400" cy="3086100"/>
-          </a:xfrm>
-          <a:custGeom>
-            <a:avLst/>
-            <a:gdLst/>
-            <a:ahLst/>
-            <a:cxnLst/>
-            <a:rect l="l" t="t" r="r" b="b"/>
-            <a:pathLst>
-              <a:path w="120000" h="120000" extrusionOk="0">
-                <a:moveTo>
-                  <a:pt x="0" y="0"/>
-                </a:moveTo>
-                <a:lnTo>
-                  <a:pt x="120000" y="0"/>
-                </a:lnTo>
-                <a:lnTo>
-                  <a:pt x="120000" y="120000"/>
-                </a:lnTo>
-                <a:lnTo>
-                  <a:pt x="0" y="120000"/>
-                </a:lnTo>
-                <a:close/>
-              </a:path>
-            </a:pathLst>
-          </a:custGeom>
-        </p:spPr>
-      </p:sp>
-    </p:spTree>
-  </p:cSld>
-  <p:clrMapOvr>
-    <a:masterClrMapping/>
-  </p:clrMapOvr>
-</p:notes>
-</file>
-
-<file path=ppt/notesSlides/notesSlide7.xml><?xml version="1.0" encoding="utf-8"?>
-<p:notes xmlns:a="http://schemas.openxmlformats.org/drawingml/2006/main" xmlns:r="http://schemas.openxmlformats.org/officeDocument/2006/relationships" xmlns:p="http://schemas.openxmlformats.org/presentationml/2006/main" showMasterSp="0" showMasterPhAnim="0">
-  <p:cSld>
-    <p:spTree>
-      <p:nvGrpSpPr>
-        <p:cNvPr id="1" name="Shape 211"/>
-        <p:cNvGrpSpPr/>
-        <p:nvPr/>
-      </p:nvGrpSpPr>
-      <p:grpSpPr>
-        <a:xfrm>
-          <a:off x="0" y="0"/>
-          <a:ext cx="0" cy="0"/>
-          <a:chOff x="0" y="0"/>
-          <a:chExt cx="0" cy="0"/>
-        </a:xfrm>
-      </p:grpSpPr>
-      <p:sp>
-        <p:nvSpPr>
-          <p:cNvPr id="212" name="Google Shape;212;g5d1d395c52_2_90:notes"/>
-          <p:cNvSpPr txBox="1">
-            <a:spLocks noGrp="1"/>
-          </p:cNvSpPr>
-          <p:nvPr>
-            <p:ph type="body" idx="1"/>
-          </p:nvPr>
-        </p:nvSpPr>
-        <p:spPr>
-          <a:xfrm>
-            <a:off x="685800" y="4400550"/>
-            <a:ext cx="5486400" cy="3600600"/>
-          </a:xfrm>
-          <a:prstGeom prst="rect">
-            <a:avLst/>
-          </a:prstGeom>
-        </p:spPr>
-        <p:txBody>
-          <a:bodyPr spcFirstLastPara="1" wrap="square" lIns="91425" tIns="45700" rIns="91425" bIns="45700" anchor="t" anchorCtr="0">
-            <a:noAutofit/>
-          </a:bodyPr>
-          <a:lstStyle/>
-          <a:p>
-            <a:pPr marL="0" lvl="0" indent="0" algn="l" rtl="0">
-              <a:spcBef>
-                <a:spcPts val="0"/>
-              </a:spcBef>
-              <a:spcAft>
-                <a:spcPts val="0"/>
-              </a:spcAft>
-              <a:buNone/>
-            </a:pPr>
-            <a:endParaRPr/>
-          </a:p>
-        </p:txBody>
-      </p:sp>
-      <p:sp>
-        <p:nvSpPr>
-          <p:cNvPr id="213" name="Google Shape;213;g5d1d395c52_2_90:notes"/>
           <p:cNvSpPr>
             <a:spLocks noGrp="1" noRot="1" noChangeAspect="1"/>
           </p:cNvSpPr>
@@ -20832,7 +20863,7 @@
               <a:buNone/>
             </a:pPr>
             <a:r>
-              <a:rPr lang="en-US" sz="2400">
+              <a:rPr lang="en-US" sz="2400" dirty="0">
                 <a:solidFill>
                   <a:schemeClr val="accent1"/>
                 </a:solidFill>
@@ -20843,7 +20874,7 @@
               </a:rPr>
               <a:t>To create an end-product that’s similar to what would be produced in a business environment, utilizing the knowledge gained in this course.  </a:t>
             </a:r>
-            <a:endParaRPr sz="2400">
+            <a:endParaRPr sz="2400" dirty="0">
               <a:solidFill>
                 <a:schemeClr val="accent1"/>
               </a:solidFill>
@@ -20867,7 +20898,7 @@
               <a:buNone/>
             </a:pPr>
             <a:r>
-              <a:rPr lang="en-US" sz="2400" b="1">
+              <a:rPr lang="en-US" sz="2400" b="1" dirty="0">
                 <a:solidFill>
                   <a:schemeClr val="accent1"/>
                 </a:solidFill>
@@ -20878,7 +20909,7 @@
               </a:rPr>
               <a:t>Steps – Data Science (CRISP-DM) Process</a:t>
             </a:r>
-            <a:endParaRPr sz="2400" b="1">
+            <a:endParaRPr sz="2400" b="1" dirty="0">
               <a:solidFill>
                 <a:schemeClr val="accent1"/>
               </a:solidFill>
@@ -20907,7 +20938,7 @@
               <a:buAutoNum type="arabicPeriod"/>
             </a:pPr>
             <a:r>
-              <a:rPr lang="en-US" sz="2400">
+              <a:rPr lang="en-US" sz="2400" dirty="0">
                 <a:solidFill>
                   <a:schemeClr val="accent1"/>
                 </a:solidFill>
@@ -20918,7 +20949,7 @@
               </a:rPr>
               <a:t>Understand Business Problem (What should you solve for?)</a:t>
             </a:r>
-            <a:endParaRPr sz="2400">
+            <a:endParaRPr sz="2400" dirty="0">
               <a:solidFill>
                 <a:schemeClr val="accent1"/>
               </a:solidFill>
@@ -20947,7 +20978,7 @@
               <a:buAutoNum type="arabicPeriod"/>
             </a:pPr>
             <a:r>
-              <a:rPr lang="en-US" sz="2400">
+              <a:rPr lang="en-US" sz="2400" dirty="0">
                 <a:solidFill>
                   <a:schemeClr val="accent1"/>
                 </a:solidFill>
@@ -20958,7 +20989,7 @@
               </a:rPr>
               <a:t>Understand Data </a:t>
             </a:r>
-            <a:endParaRPr sz="2400">
+            <a:endParaRPr sz="2400" dirty="0">
               <a:solidFill>
                 <a:schemeClr val="accent1"/>
               </a:solidFill>
@@ -20987,7 +21018,7 @@
               <a:buAutoNum type="arabicPeriod"/>
             </a:pPr>
             <a:r>
-              <a:rPr lang="en-US" sz="2400">
+              <a:rPr lang="en-US" sz="2400" dirty="0">
                 <a:solidFill>
                   <a:schemeClr val="accent1"/>
                 </a:solidFill>
@@ -20998,7 +21029,7 @@
               </a:rPr>
               <a:t>Prepare Data</a:t>
             </a:r>
-            <a:endParaRPr sz="2400">
+            <a:endParaRPr sz="2400" dirty="0">
               <a:solidFill>
                 <a:schemeClr val="accent1"/>
               </a:solidFill>
@@ -21027,7 +21058,7 @@
               <a:buAutoNum type="arabicPeriod"/>
             </a:pPr>
             <a:r>
-              <a:rPr lang="en-US" sz="2400">
+              <a:rPr lang="en-US" sz="2400" dirty="0">
                 <a:solidFill>
                   <a:schemeClr val="accent1"/>
                 </a:solidFill>
@@ -21038,7 +21069,7 @@
               </a:rPr>
               <a:t>Build Model/Data Flow</a:t>
             </a:r>
-            <a:endParaRPr sz="2400">
+            <a:endParaRPr sz="2400" dirty="0">
               <a:solidFill>
                 <a:schemeClr val="accent1"/>
               </a:solidFill>
@@ -21067,7 +21098,7 @@
               <a:buAutoNum type="arabicPeriod"/>
             </a:pPr>
             <a:r>
-              <a:rPr lang="en-US" sz="2400">
+              <a:rPr lang="en-US" sz="2400" dirty="0">
                 <a:solidFill>
                   <a:schemeClr val="accent1"/>
                 </a:solidFill>
@@ -21078,7 +21109,7 @@
               </a:rPr>
               <a:t>Test/Evaluate Process</a:t>
             </a:r>
-            <a:endParaRPr sz="2400">
+            <a:endParaRPr sz="2400" dirty="0">
               <a:solidFill>
                 <a:schemeClr val="accent1"/>
               </a:solidFill>
@@ -21107,7 +21138,7 @@
               <a:buAutoNum type="arabicPeriod"/>
             </a:pPr>
             <a:r>
-              <a:rPr lang="en-US" sz="2400">
+              <a:rPr lang="en-US" sz="2400" dirty="0">
                 <a:solidFill>
                   <a:schemeClr val="accent1"/>
                 </a:solidFill>
@@ -21118,7 +21149,7 @@
               </a:rPr>
               <a:t>Deployment - Answer business questions, Generate additional questions</a:t>
             </a:r>
-            <a:endParaRPr sz="2400">
+            <a:endParaRPr sz="2400" dirty="0">
               <a:solidFill>
                 <a:schemeClr val="accent1"/>
               </a:solidFill>
@@ -21139,6 +21170,1608 @@
 </file>
 
 <file path=ppt/slides/slide3.xml><?xml version="1.0" encoding="utf-8"?>
+<p:sld xmlns:a="http://schemas.openxmlformats.org/drawingml/2006/main" xmlns:r="http://schemas.openxmlformats.org/officeDocument/2006/relationships" xmlns:p="http://schemas.openxmlformats.org/presentationml/2006/main">
+  <p:cSld>
+    <p:spTree>
+      <p:nvGrpSpPr>
+        <p:cNvPr id="1" name="Shape 196"/>
+        <p:cNvGrpSpPr/>
+        <p:nvPr/>
+      </p:nvGrpSpPr>
+      <p:grpSpPr>
+        <a:xfrm>
+          <a:off x="0" y="0"/>
+          <a:ext cx="0" cy="0"/>
+          <a:chOff x="0" y="0"/>
+          <a:chExt cx="0" cy="0"/>
+        </a:xfrm>
+      </p:grpSpPr>
+      <p:sp>
+        <p:nvSpPr>
+          <p:cNvPr id="197" name="Google Shape;197;p30"/>
+          <p:cNvSpPr txBox="1">
+            <a:spLocks noGrp="1"/>
+          </p:cNvSpPr>
+          <p:nvPr>
+            <p:ph type="title" idx="4294967295"/>
+          </p:nvPr>
+        </p:nvSpPr>
+        <p:spPr>
+          <a:xfrm>
+            <a:off x="913795" y="609600"/>
+            <a:ext cx="10353900" cy="970500"/>
+          </a:xfrm>
+          <a:prstGeom prst="rect">
+            <a:avLst/>
+          </a:prstGeom>
+          <a:noFill/>
+          <a:ln>
+            <a:noFill/>
+          </a:ln>
+          <a:effectLst>
+            <a:outerShdw blurRad="25400">
+              <a:srgbClr val="000000">
+                <a:alpha val="45880"/>
+              </a:srgbClr>
+            </a:outerShdw>
+          </a:effectLst>
+        </p:spPr>
+        <p:txBody>
+          <a:bodyPr spcFirstLastPara="1" wrap="square" lIns="91425" tIns="45700" rIns="91425" bIns="45700" anchor="ctr" anchorCtr="0">
+            <a:noAutofit/>
+          </a:bodyPr>
+          <a:lstStyle/>
+          <a:p>
+            <a:pPr marL="0" lvl="0" indent="0" algn="l" rtl="0">
+              <a:spcBef>
+                <a:spcPts val="0"/>
+              </a:spcBef>
+              <a:spcAft>
+                <a:spcPts val="0"/>
+              </a:spcAft>
+              <a:buClr>
+                <a:schemeClr val="lt2"/>
+              </a:buClr>
+              <a:buSzPts val="4000"/>
+              <a:buFont typeface="Lustria"/>
+              <a:buNone/>
+            </a:pPr>
+            <a:r>
+              <a:rPr lang="en-US"/>
+              <a:t>Business Questions</a:t>
+            </a:r>
+            <a:endParaRPr/>
+          </a:p>
+        </p:txBody>
+      </p:sp>
+      <p:sp>
+        <p:nvSpPr>
+          <p:cNvPr id="198" name="Google Shape;198;p30"/>
+          <p:cNvSpPr txBox="1">
+            <a:spLocks noGrp="1"/>
+          </p:cNvSpPr>
+          <p:nvPr>
+            <p:ph type="body" idx="4294967295"/>
+          </p:nvPr>
+        </p:nvSpPr>
+        <p:spPr>
+          <a:xfrm>
+            <a:off x="913795" y="1732449"/>
+            <a:ext cx="10353900" cy="4058700"/>
+          </a:xfrm>
+          <a:prstGeom prst="rect">
+            <a:avLst/>
+          </a:prstGeom>
+          <a:noFill/>
+          <a:ln>
+            <a:noFill/>
+          </a:ln>
+          <a:effectLst>
+            <a:outerShdw blurRad="25400">
+              <a:srgbClr val="000000">
+                <a:alpha val="45880"/>
+              </a:srgbClr>
+            </a:outerShdw>
+          </a:effectLst>
+        </p:spPr>
+        <p:txBody>
+          <a:bodyPr spcFirstLastPara="1" wrap="square" lIns="91425" tIns="45700" rIns="91425" bIns="45700" anchor="t" anchorCtr="0">
+            <a:noAutofit/>
+          </a:bodyPr>
+          <a:lstStyle/>
+          <a:p>
+            <a:pPr marL="342900" lvl="0" indent="-369500" algn="l" rtl="0">
+              <a:spcBef>
+                <a:spcPts val="0"/>
+              </a:spcBef>
+              <a:spcAft>
+                <a:spcPts val="0"/>
+              </a:spcAft>
+              <a:buSzPts val="2400"/>
+              <a:buChar char="●"/>
+            </a:pPr>
+            <a:r>
+              <a:rPr lang="en-US" sz="2400" dirty="0"/>
+              <a:t>Useful questions often require basic domain knowledge</a:t>
+            </a:r>
+            <a:endParaRPr sz="2400" dirty="0"/>
+          </a:p>
+          <a:p>
+            <a:pPr marL="342900" lvl="0" indent="-217100" algn="l" rtl="0">
+              <a:spcBef>
+                <a:spcPts val="1000"/>
+              </a:spcBef>
+              <a:spcAft>
+                <a:spcPts val="0"/>
+              </a:spcAft>
+              <a:buSzPts val="1400"/>
+              <a:buNone/>
+            </a:pPr>
+            <a:endParaRPr sz="2400" dirty="0"/>
+          </a:p>
+          <a:p>
+            <a:pPr marL="342900" lvl="0" indent="-369500" algn="l" rtl="0">
+              <a:spcBef>
+                <a:spcPts val="1000"/>
+              </a:spcBef>
+              <a:spcAft>
+                <a:spcPts val="0"/>
+              </a:spcAft>
+              <a:buSzPts val="2400"/>
+              <a:buChar char="●"/>
+            </a:pPr>
+            <a:r>
+              <a:rPr lang="en-US" sz="2400" dirty="0"/>
+              <a:t>Characteristics of effective questions</a:t>
+            </a:r>
+            <a:endParaRPr sz="2400" dirty="0"/>
+          </a:p>
+          <a:p>
+            <a:pPr marL="719999" lvl="1" indent="-342389" algn="l" rtl="0">
+              <a:spcBef>
+                <a:spcPts val="960"/>
+              </a:spcBef>
+              <a:spcAft>
+                <a:spcPts val="0"/>
+              </a:spcAft>
+              <a:buSzPts val="2400"/>
+              <a:buChar char="○"/>
+            </a:pPr>
+            <a:r>
+              <a:rPr lang="en-US" sz="2400" dirty="0"/>
+              <a:t>Lead to action</a:t>
+            </a:r>
+            <a:endParaRPr sz="2400" dirty="0"/>
+          </a:p>
+          <a:p>
+            <a:pPr marL="719999" lvl="1" indent="-342389" algn="l" rtl="0">
+              <a:spcBef>
+                <a:spcPts val="960"/>
+              </a:spcBef>
+              <a:spcAft>
+                <a:spcPts val="0"/>
+              </a:spcAft>
+              <a:buSzPts val="2400"/>
+              <a:buChar char="○"/>
+            </a:pPr>
+            <a:r>
+              <a:rPr lang="en-US" sz="2400" dirty="0"/>
+              <a:t>Are specific</a:t>
+            </a:r>
+            <a:endParaRPr sz="2400" dirty="0"/>
+          </a:p>
+          <a:p>
+            <a:pPr marL="719999" lvl="1" indent="-342389" algn="l" rtl="0">
+              <a:spcBef>
+                <a:spcPts val="960"/>
+              </a:spcBef>
+              <a:spcAft>
+                <a:spcPts val="0"/>
+              </a:spcAft>
+              <a:buSzPts val="2400"/>
+              <a:buChar char="○"/>
+            </a:pPr>
+            <a:r>
+              <a:rPr lang="en-US" sz="2400" dirty="0"/>
+              <a:t>Clarify understanding</a:t>
+            </a:r>
+            <a:endParaRPr sz="2400" dirty="0"/>
+          </a:p>
+          <a:p>
+            <a:pPr marL="719999" lvl="1" indent="-342389" algn="l" rtl="0">
+              <a:spcBef>
+                <a:spcPts val="960"/>
+              </a:spcBef>
+              <a:spcAft>
+                <a:spcPts val="0"/>
+              </a:spcAft>
+              <a:buSzPts val="2400"/>
+              <a:buChar char="○"/>
+            </a:pPr>
+            <a:r>
+              <a:rPr lang="en-US" sz="2400" dirty="0"/>
+              <a:t>Focus on important features</a:t>
+            </a:r>
+            <a:endParaRPr sz="2400" dirty="0"/>
+          </a:p>
+          <a:p>
+            <a:pPr marL="719999" lvl="1" indent="-342389" algn="l" rtl="0">
+              <a:spcBef>
+                <a:spcPts val="960"/>
+              </a:spcBef>
+              <a:spcAft>
+                <a:spcPts val="0"/>
+              </a:spcAft>
+              <a:buSzPts val="2400"/>
+              <a:buChar char="○"/>
+            </a:pPr>
+            <a:r>
+              <a:rPr lang="en-US" sz="2400" dirty="0"/>
+              <a:t>Expose underlying issues</a:t>
+            </a:r>
+            <a:endParaRPr sz="2400" dirty="0"/>
+          </a:p>
+          <a:p>
+            <a:pPr marL="342900" lvl="0" indent="-217100" algn="l" rtl="0">
+              <a:spcBef>
+                <a:spcPts val="1000"/>
+              </a:spcBef>
+              <a:spcAft>
+                <a:spcPts val="0"/>
+              </a:spcAft>
+              <a:buSzPts val="1400"/>
+              <a:buNone/>
+            </a:pPr>
+            <a:endParaRPr sz="2400" dirty="0"/>
+          </a:p>
+          <a:p>
+            <a:pPr marL="342900" lvl="0" indent="-217100" algn="l" rtl="0">
+              <a:spcBef>
+                <a:spcPts val="1000"/>
+              </a:spcBef>
+              <a:spcAft>
+                <a:spcPts val="0"/>
+              </a:spcAft>
+              <a:buSzPts val="1400"/>
+              <a:buNone/>
+            </a:pPr>
+            <a:endParaRPr dirty="0"/>
+          </a:p>
+        </p:txBody>
+      </p:sp>
+    </p:spTree>
+  </p:cSld>
+  <p:clrMapOvr>
+    <a:masterClrMapping/>
+  </p:clrMapOvr>
+</p:sld>
+</file>
+
+<file path=ppt/slides/slide4.xml><?xml version="1.0" encoding="utf-8"?>
+<p:sld xmlns:a="http://schemas.openxmlformats.org/drawingml/2006/main" xmlns:r="http://schemas.openxmlformats.org/officeDocument/2006/relationships" xmlns:p="http://schemas.openxmlformats.org/presentationml/2006/main">
+  <p:cSld>
+    <p:spTree>
+      <p:nvGrpSpPr>
+        <p:cNvPr id="1" name="Shape 202"/>
+        <p:cNvGrpSpPr/>
+        <p:nvPr/>
+      </p:nvGrpSpPr>
+      <p:grpSpPr>
+        <a:xfrm>
+          <a:off x="0" y="0"/>
+          <a:ext cx="0" cy="0"/>
+          <a:chOff x="0" y="0"/>
+          <a:chExt cx="0" cy="0"/>
+        </a:xfrm>
+      </p:grpSpPr>
+      <p:sp>
+        <p:nvSpPr>
+          <p:cNvPr id="203" name="Google Shape;203;p31"/>
+          <p:cNvSpPr txBox="1">
+            <a:spLocks noGrp="1"/>
+          </p:cNvSpPr>
+          <p:nvPr>
+            <p:ph type="title" idx="4294967295"/>
+          </p:nvPr>
+        </p:nvSpPr>
+        <p:spPr>
+          <a:xfrm>
+            <a:off x="913795" y="609600"/>
+            <a:ext cx="10353900" cy="970500"/>
+          </a:xfrm>
+          <a:prstGeom prst="rect">
+            <a:avLst/>
+          </a:prstGeom>
+          <a:noFill/>
+          <a:ln>
+            <a:noFill/>
+          </a:ln>
+          <a:effectLst>
+            <a:outerShdw blurRad="25400">
+              <a:srgbClr val="000000">
+                <a:alpha val="45880"/>
+              </a:srgbClr>
+            </a:outerShdw>
+          </a:effectLst>
+        </p:spPr>
+        <p:txBody>
+          <a:bodyPr spcFirstLastPara="1" wrap="square" lIns="91425" tIns="45700" rIns="91425" bIns="45700" anchor="ctr" anchorCtr="0">
+            <a:noAutofit/>
+          </a:bodyPr>
+          <a:lstStyle/>
+          <a:p>
+            <a:pPr marL="0" lvl="0" indent="0" algn="l" rtl="0">
+              <a:spcBef>
+                <a:spcPts val="0"/>
+              </a:spcBef>
+              <a:spcAft>
+                <a:spcPts val="0"/>
+              </a:spcAft>
+              <a:buClr>
+                <a:schemeClr val="lt2"/>
+              </a:buClr>
+              <a:buSzPts val="4000"/>
+              <a:buFont typeface="Lustria"/>
+              <a:buNone/>
+            </a:pPr>
+            <a:r>
+              <a:rPr lang="en-US" dirty="0"/>
+              <a:t>Business Questions</a:t>
+            </a:r>
+            <a:endParaRPr dirty="0"/>
+          </a:p>
+        </p:txBody>
+      </p:sp>
+      <p:sp>
+        <p:nvSpPr>
+          <p:cNvPr id="204" name="Google Shape;204;p31"/>
+          <p:cNvSpPr txBox="1"/>
+          <p:nvPr/>
+        </p:nvSpPr>
+        <p:spPr>
+          <a:xfrm>
+            <a:off x="919050" y="1705100"/>
+            <a:ext cx="10353900" cy="3000000"/>
+          </a:xfrm>
+          <a:prstGeom prst="rect">
+            <a:avLst/>
+          </a:prstGeom>
+          <a:noFill/>
+          <a:ln>
+            <a:noFill/>
+          </a:ln>
+        </p:spPr>
+        <p:txBody>
+          <a:bodyPr spcFirstLastPara="1" wrap="square" lIns="91425" tIns="91425" rIns="91425" bIns="91425" anchor="t" anchorCtr="0">
+            <a:noAutofit/>
+          </a:bodyPr>
+          <a:lstStyle/>
+          <a:p>
+            <a:pPr marL="342900" lvl="0" indent="-344100" algn="l" rtl="0">
+              <a:lnSpc>
+                <a:spcPct val="115000"/>
+              </a:lnSpc>
+              <a:spcBef>
+                <a:spcPts val="0"/>
+              </a:spcBef>
+              <a:spcAft>
+                <a:spcPts val="0"/>
+              </a:spcAft>
+              <a:buClr>
+                <a:schemeClr val="accent1"/>
+              </a:buClr>
+              <a:buSzPts val="2000"/>
+              <a:buFont typeface="Lato"/>
+              <a:buChar char="●"/>
+            </a:pPr>
+            <a:r>
+              <a:rPr lang="en-US" sz="2000" b="1" dirty="0">
+                <a:solidFill>
+                  <a:schemeClr val="accent1"/>
+                </a:solidFill>
+                <a:latin typeface="Lato"/>
+                <a:ea typeface="Lato"/>
+                <a:cs typeface="Lato"/>
+                <a:sym typeface="Lato"/>
+              </a:rPr>
+              <a:t>Sales</a:t>
+            </a:r>
+            <a:endParaRPr sz="2000" b="1" dirty="0">
+              <a:solidFill>
+                <a:schemeClr val="accent1"/>
+              </a:solidFill>
+              <a:latin typeface="Lato"/>
+              <a:ea typeface="Lato"/>
+              <a:cs typeface="Lato"/>
+              <a:sym typeface="Lato"/>
+            </a:endParaRPr>
+          </a:p>
+          <a:p>
+            <a:pPr marL="719999" lvl="1" indent="-269999" algn="l" rtl="0">
+              <a:lnSpc>
+                <a:spcPct val="115000"/>
+              </a:lnSpc>
+              <a:spcBef>
+                <a:spcPts val="1000"/>
+              </a:spcBef>
+              <a:spcAft>
+                <a:spcPts val="0"/>
+              </a:spcAft>
+              <a:buClr>
+                <a:schemeClr val="accent1"/>
+              </a:buClr>
+              <a:buSzPts val="1400"/>
+              <a:buFont typeface="Lato"/>
+              <a:buChar char="○"/>
+            </a:pPr>
+            <a:r>
+              <a:rPr lang="en-US" sz="2000" dirty="0">
+                <a:solidFill>
+                  <a:schemeClr val="accent1"/>
+                </a:solidFill>
+                <a:latin typeface="Lato"/>
+                <a:ea typeface="Lato"/>
+                <a:cs typeface="Lato"/>
+                <a:sym typeface="Lato"/>
+              </a:rPr>
+              <a:t>How many people are seeing our ads?</a:t>
+            </a:r>
+            <a:endParaRPr sz="1500" dirty="0">
+              <a:solidFill>
+                <a:schemeClr val="accent1"/>
+              </a:solidFill>
+              <a:latin typeface="Lato"/>
+              <a:ea typeface="Lato"/>
+              <a:cs typeface="Lato"/>
+              <a:sym typeface="Lato"/>
+            </a:endParaRPr>
+          </a:p>
+          <a:p>
+            <a:pPr marL="719999" lvl="1" indent="-269999" algn="l" rtl="0">
+              <a:lnSpc>
+                <a:spcPct val="115000"/>
+              </a:lnSpc>
+              <a:spcBef>
+                <a:spcPts val="1000"/>
+              </a:spcBef>
+              <a:spcAft>
+                <a:spcPts val="0"/>
+              </a:spcAft>
+              <a:buClr>
+                <a:schemeClr val="accent1"/>
+              </a:buClr>
+              <a:buSzPts val="1400"/>
+              <a:buFont typeface="Lato"/>
+              <a:buChar char="○"/>
+            </a:pPr>
+            <a:r>
+              <a:rPr lang="en-US" sz="2000" dirty="0">
+                <a:solidFill>
+                  <a:schemeClr val="accent1"/>
+                </a:solidFill>
+                <a:latin typeface="Lato"/>
+                <a:ea typeface="Lato"/>
+                <a:cs typeface="Lato"/>
+                <a:sym typeface="Lato"/>
+              </a:rPr>
+              <a:t>What is our conversion rate?</a:t>
+            </a:r>
+            <a:endParaRPr sz="1500" dirty="0">
+              <a:solidFill>
+                <a:schemeClr val="accent1"/>
+              </a:solidFill>
+              <a:latin typeface="Lato"/>
+              <a:ea typeface="Lato"/>
+              <a:cs typeface="Lato"/>
+              <a:sym typeface="Lato"/>
+            </a:endParaRPr>
+          </a:p>
+          <a:p>
+            <a:pPr marL="719999" lvl="1" indent="-269999" algn="l" rtl="0">
+              <a:lnSpc>
+                <a:spcPct val="115000"/>
+              </a:lnSpc>
+              <a:spcBef>
+                <a:spcPts val="1000"/>
+              </a:spcBef>
+              <a:spcAft>
+                <a:spcPts val="0"/>
+              </a:spcAft>
+              <a:buClr>
+                <a:schemeClr val="accent1"/>
+              </a:buClr>
+              <a:buSzPts val="1400"/>
+              <a:buFont typeface="Lato"/>
+              <a:buChar char="○"/>
+            </a:pPr>
+            <a:r>
+              <a:rPr lang="en-US" sz="2000" dirty="0">
+                <a:solidFill>
+                  <a:schemeClr val="accent1"/>
+                </a:solidFill>
+                <a:latin typeface="Lato"/>
+                <a:ea typeface="Lato"/>
+                <a:cs typeface="Lato"/>
+                <a:sym typeface="Lato"/>
+              </a:rPr>
+              <a:t>Who are top performing salespeople / What are our top performing ads?</a:t>
+            </a:r>
+            <a:endParaRPr sz="1700" dirty="0">
+              <a:solidFill>
+                <a:schemeClr val="accent1"/>
+              </a:solidFill>
+              <a:latin typeface="Lato"/>
+              <a:ea typeface="Lato"/>
+              <a:cs typeface="Lato"/>
+              <a:sym typeface="Lato"/>
+            </a:endParaRPr>
+          </a:p>
+          <a:p>
+            <a:pPr marL="342900" lvl="0" indent="-344100" algn="l" rtl="0">
+              <a:lnSpc>
+                <a:spcPct val="115000"/>
+              </a:lnSpc>
+              <a:spcBef>
+                <a:spcPts val="1000"/>
+              </a:spcBef>
+              <a:spcAft>
+                <a:spcPts val="0"/>
+              </a:spcAft>
+              <a:buClr>
+                <a:schemeClr val="accent1"/>
+              </a:buClr>
+              <a:buSzPts val="2000"/>
+              <a:buFont typeface="Lato"/>
+              <a:buChar char="●"/>
+            </a:pPr>
+            <a:r>
+              <a:rPr lang="en-US" sz="2000" b="1" dirty="0">
+                <a:solidFill>
+                  <a:schemeClr val="accent1"/>
+                </a:solidFill>
+                <a:latin typeface="Lato"/>
+                <a:ea typeface="Lato"/>
+                <a:cs typeface="Lato"/>
+                <a:sym typeface="Lato"/>
+              </a:rPr>
+              <a:t>Operations</a:t>
+            </a:r>
+            <a:endParaRPr sz="2000" b="1" dirty="0">
+              <a:solidFill>
+                <a:schemeClr val="accent1"/>
+              </a:solidFill>
+              <a:latin typeface="Lato"/>
+              <a:ea typeface="Lato"/>
+              <a:cs typeface="Lato"/>
+              <a:sym typeface="Lato"/>
+            </a:endParaRPr>
+          </a:p>
+          <a:p>
+            <a:pPr marL="719999" lvl="1" indent="-269999" algn="l" rtl="0">
+              <a:lnSpc>
+                <a:spcPct val="115000"/>
+              </a:lnSpc>
+              <a:spcBef>
+                <a:spcPts val="1000"/>
+              </a:spcBef>
+              <a:spcAft>
+                <a:spcPts val="0"/>
+              </a:spcAft>
+              <a:buClr>
+                <a:schemeClr val="accent1"/>
+              </a:buClr>
+              <a:buSzPts val="1400"/>
+              <a:buFont typeface="Lato"/>
+              <a:buChar char="○"/>
+            </a:pPr>
+            <a:r>
+              <a:rPr lang="en-US" sz="2000" dirty="0">
+                <a:solidFill>
+                  <a:schemeClr val="accent1"/>
+                </a:solidFill>
+                <a:latin typeface="Lato"/>
+                <a:ea typeface="Lato"/>
+                <a:cs typeface="Lato"/>
+                <a:sym typeface="Lato"/>
+              </a:rPr>
+              <a:t>What does it cost to make our product?</a:t>
+            </a:r>
+            <a:endParaRPr sz="1500" dirty="0">
+              <a:solidFill>
+                <a:schemeClr val="accent1"/>
+              </a:solidFill>
+              <a:latin typeface="Lato"/>
+              <a:ea typeface="Lato"/>
+              <a:cs typeface="Lato"/>
+              <a:sym typeface="Lato"/>
+            </a:endParaRPr>
+          </a:p>
+          <a:p>
+            <a:pPr marL="719999" lvl="1" indent="-269999" algn="l" rtl="0">
+              <a:lnSpc>
+                <a:spcPct val="115000"/>
+              </a:lnSpc>
+              <a:spcBef>
+                <a:spcPts val="1000"/>
+              </a:spcBef>
+              <a:spcAft>
+                <a:spcPts val="0"/>
+              </a:spcAft>
+              <a:buClr>
+                <a:schemeClr val="accent1"/>
+              </a:buClr>
+              <a:buSzPts val="1400"/>
+              <a:buFont typeface="Lato"/>
+              <a:buChar char="○"/>
+            </a:pPr>
+            <a:r>
+              <a:rPr lang="en-US" sz="2000" dirty="0">
+                <a:solidFill>
+                  <a:schemeClr val="accent1"/>
+                </a:solidFill>
+                <a:latin typeface="Lato"/>
+                <a:ea typeface="Lato"/>
+                <a:cs typeface="Lato"/>
+                <a:sym typeface="Lato"/>
+              </a:rPr>
+              <a:t>What products are encountering zero-inventory?</a:t>
+            </a:r>
+            <a:endParaRPr sz="1700" dirty="0">
+              <a:solidFill>
+                <a:schemeClr val="accent1"/>
+              </a:solidFill>
+              <a:latin typeface="Lato"/>
+              <a:ea typeface="Lato"/>
+              <a:cs typeface="Lato"/>
+              <a:sym typeface="Lato"/>
+            </a:endParaRPr>
+          </a:p>
+          <a:p>
+            <a:pPr marL="342900" lvl="0" indent="-344100" algn="l" rtl="0">
+              <a:lnSpc>
+                <a:spcPct val="115000"/>
+              </a:lnSpc>
+              <a:spcBef>
+                <a:spcPts val="1000"/>
+              </a:spcBef>
+              <a:spcAft>
+                <a:spcPts val="0"/>
+              </a:spcAft>
+              <a:buClr>
+                <a:schemeClr val="accent1"/>
+              </a:buClr>
+              <a:buSzPts val="2000"/>
+              <a:buFont typeface="Lato"/>
+              <a:buChar char="●"/>
+            </a:pPr>
+            <a:r>
+              <a:rPr lang="en-US" sz="2000" b="1" dirty="0">
+                <a:solidFill>
+                  <a:schemeClr val="accent1"/>
+                </a:solidFill>
+                <a:latin typeface="Lato"/>
+                <a:ea typeface="Lato"/>
+                <a:cs typeface="Lato"/>
+                <a:sym typeface="Lato"/>
+              </a:rPr>
+              <a:t>Financial Risk</a:t>
+            </a:r>
+            <a:endParaRPr sz="2000" b="1" dirty="0">
+              <a:solidFill>
+                <a:schemeClr val="accent1"/>
+              </a:solidFill>
+              <a:latin typeface="Lato"/>
+              <a:ea typeface="Lato"/>
+              <a:cs typeface="Lato"/>
+              <a:sym typeface="Lato"/>
+            </a:endParaRPr>
+          </a:p>
+          <a:p>
+            <a:pPr marL="719999" lvl="1" indent="-269999" algn="l" rtl="0">
+              <a:lnSpc>
+                <a:spcPct val="115000"/>
+              </a:lnSpc>
+              <a:spcBef>
+                <a:spcPts val="1000"/>
+              </a:spcBef>
+              <a:spcAft>
+                <a:spcPts val="0"/>
+              </a:spcAft>
+              <a:buClr>
+                <a:schemeClr val="accent1"/>
+              </a:buClr>
+              <a:buSzPts val="1400"/>
+              <a:buFont typeface="Lato"/>
+              <a:buChar char="○"/>
+            </a:pPr>
+            <a:r>
+              <a:rPr lang="en-US" sz="2000" dirty="0">
+                <a:solidFill>
+                  <a:schemeClr val="accent1"/>
+                </a:solidFill>
+                <a:latin typeface="Lato"/>
+                <a:ea typeface="Lato"/>
+                <a:cs typeface="Lato"/>
+                <a:sym typeface="Lato"/>
+              </a:rPr>
+              <a:t>Which customers are at risk of defaulting?</a:t>
+            </a:r>
+            <a:endParaRPr sz="1500" dirty="0">
+              <a:solidFill>
+                <a:schemeClr val="accent1"/>
+              </a:solidFill>
+              <a:latin typeface="Lato"/>
+              <a:ea typeface="Lato"/>
+              <a:cs typeface="Lato"/>
+              <a:sym typeface="Lato"/>
+            </a:endParaRPr>
+          </a:p>
+          <a:p>
+            <a:pPr marL="719999" lvl="1" indent="-269999" algn="l" rtl="0">
+              <a:lnSpc>
+                <a:spcPct val="115000"/>
+              </a:lnSpc>
+              <a:spcBef>
+                <a:spcPts val="1000"/>
+              </a:spcBef>
+              <a:spcAft>
+                <a:spcPts val="0"/>
+              </a:spcAft>
+              <a:buClr>
+                <a:schemeClr val="accent1"/>
+              </a:buClr>
+              <a:buSzPts val="1400"/>
+              <a:buFont typeface="Lato"/>
+              <a:buChar char="○"/>
+            </a:pPr>
+            <a:r>
+              <a:rPr lang="en-US" sz="2000" dirty="0">
+                <a:solidFill>
+                  <a:schemeClr val="accent1"/>
+                </a:solidFill>
+                <a:latin typeface="Lato"/>
+                <a:ea typeface="Lato"/>
+                <a:cs typeface="Lato"/>
+                <a:sym typeface="Lato"/>
+              </a:rPr>
+              <a:t>What is our exposure to catastrophic events?</a:t>
+            </a:r>
+            <a:endParaRPr dirty="0"/>
+          </a:p>
+        </p:txBody>
+      </p:sp>
+    </p:spTree>
+  </p:cSld>
+  <p:clrMapOvr>
+    <a:masterClrMapping/>
+  </p:clrMapOvr>
+</p:sld>
+</file>
+
+<file path=ppt/slides/slide5.xml><?xml version="1.0" encoding="utf-8"?>
+<p:sld xmlns:a="http://schemas.openxmlformats.org/drawingml/2006/main" xmlns:r="http://schemas.openxmlformats.org/officeDocument/2006/relationships" xmlns:p="http://schemas.openxmlformats.org/presentationml/2006/main">
+  <p:cSld>
+    <p:spTree>
+      <p:nvGrpSpPr>
+        <p:cNvPr id="1" name="Shape 214"/>
+        <p:cNvGrpSpPr/>
+        <p:nvPr/>
+      </p:nvGrpSpPr>
+      <p:grpSpPr>
+        <a:xfrm>
+          <a:off x="0" y="0"/>
+          <a:ext cx="0" cy="0"/>
+          <a:chOff x="0" y="0"/>
+          <a:chExt cx="0" cy="0"/>
+        </a:xfrm>
+      </p:grpSpPr>
+      <p:sp>
+        <p:nvSpPr>
+          <p:cNvPr id="215" name="Google Shape;215;p33"/>
+          <p:cNvSpPr txBox="1">
+            <a:spLocks noGrp="1"/>
+          </p:cNvSpPr>
+          <p:nvPr>
+            <p:ph type="ctrTitle"/>
+          </p:nvPr>
+        </p:nvSpPr>
+        <p:spPr>
+          <a:xfrm>
+            <a:off x="913795" y="609600"/>
+            <a:ext cx="10353900" cy="970500"/>
+          </a:xfrm>
+          <a:prstGeom prst="rect">
+            <a:avLst/>
+          </a:prstGeom>
+          <a:noFill/>
+          <a:ln>
+            <a:noFill/>
+          </a:ln>
+          <a:effectLst>
+            <a:outerShdw blurRad="25400">
+              <a:srgbClr val="000000">
+                <a:alpha val="45880"/>
+              </a:srgbClr>
+            </a:outerShdw>
+          </a:effectLst>
+        </p:spPr>
+        <p:txBody>
+          <a:bodyPr spcFirstLastPara="1" wrap="square" lIns="91425" tIns="45700" rIns="91425" bIns="45700" anchor="ctr" anchorCtr="0">
+            <a:noAutofit/>
+          </a:bodyPr>
+          <a:lstStyle/>
+          <a:p>
+            <a:pPr marL="0" lvl="0" indent="0" algn="l" rtl="0">
+              <a:spcBef>
+                <a:spcPts val="0"/>
+              </a:spcBef>
+              <a:spcAft>
+                <a:spcPts val="0"/>
+              </a:spcAft>
+              <a:buClr>
+                <a:schemeClr val="lt2"/>
+              </a:buClr>
+              <a:buSzPts val="4000"/>
+              <a:buFont typeface="Lustria"/>
+              <a:buNone/>
+            </a:pPr>
+            <a:r>
+              <a:rPr lang="en-US" sz="3600"/>
+              <a:t>Class Project - Problem Understanding &amp; Goal</a:t>
+            </a:r>
+            <a:endParaRPr sz="3600"/>
+          </a:p>
+        </p:txBody>
+      </p:sp>
+      <p:sp>
+        <p:nvSpPr>
+          <p:cNvPr id="216" name="Google Shape;216;p33"/>
+          <p:cNvSpPr txBox="1"/>
+          <p:nvPr/>
+        </p:nvSpPr>
+        <p:spPr>
+          <a:xfrm>
+            <a:off x="6224750" y="4556600"/>
+            <a:ext cx="5611200" cy="700800"/>
+          </a:xfrm>
+          <a:prstGeom prst="rect">
+            <a:avLst/>
+          </a:prstGeom>
+          <a:noFill/>
+          <a:ln>
+            <a:noFill/>
+          </a:ln>
+        </p:spPr>
+        <p:txBody>
+          <a:bodyPr spcFirstLastPara="1" wrap="square" lIns="91425" tIns="91425" rIns="91425" bIns="91425" anchor="t" anchorCtr="0">
+            <a:noAutofit/>
+          </a:bodyPr>
+          <a:lstStyle/>
+          <a:p>
+            <a:pPr marL="0" lvl="0" indent="0" algn="l" rtl="0">
+              <a:lnSpc>
+                <a:spcPct val="80000"/>
+              </a:lnSpc>
+              <a:spcBef>
+                <a:spcPts val="820"/>
+              </a:spcBef>
+              <a:spcAft>
+                <a:spcPts val="0"/>
+              </a:spcAft>
+              <a:buNone/>
+            </a:pPr>
+            <a:r>
+              <a:rPr lang="en-US" sz="1800" b="1" u="sng" dirty="0">
+                <a:solidFill>
+                  <a:schemeClr val="accent1"/>
+                </a:solidFill>
+                <a:latin typeface="Lato"/>
+                <a:ea typeface="Lato"/>
+                <a:cs typeface="Lato"/>
+                <a:sym typeface="Lato"/>
+              </a:rPr>
+              <a:t>Tonight’s Project Steps</a:t>
+            </a:r>
+            <a:r>
+              <a:rPr lang="en-US" sz="1800" b="1" dirty="0">
+                <a:solidFill>
+                  <a:schemeClr val="accent1"/>
+                </a:solidFill>
+                <a:latin typeface="Lato"/>
+                <a:ea typeface="Lato"/>
+                <a:cs typeface="Lato"/>
+                <a:sym typeface="Lato"/>
+              </a:rPr>
+              <a:t>:  </a:t>
+            </a:r>
+            <a:endParaRPr sz="1800" b="1" dirty="0">
+              <a:solidFill>
+                <a:schemeClr val="accent1"/>
+              </a:solidFill>
+              <a:latin typeface="Lato"/>
+              <a:ea typeface="Lato"/>
+              <a:cs typeface="Lato"/>
+              <a:sym typeface="Lato"/>
+            </a:endParaRPr>
+          </a:p>
+          <a:p>
+            <a:pPr marL="0" lvl="0" indent="0" algn="l" rtl="0">
+              <a:lnSpc>
+                <a:spcPct val="80000"/>
+              </a:lnSpc>
+              <a:spcBef>
+                <a:spcPts val="820"/>
+              </a:spcBef>
+              <a:spcAft>
+                <a:spcPts val="0"/>
+              </a:spcAft>
+              <a:buNone/>
+            </a:pPr>
+            <a:r>
+              <a:rPr lang="en-US" sz="1800" b="1" dirty="0">
+                <a:solidFill>
+                  <a:schemeClr val="accent1"/>
+                </a:solidFill>
+                <a:latin typeface="Lato"/>
+                <a:ea typeface="Lato"/>
+                <a:cs typeface="Lato"/>
+                <a:sym typeface="Lato"/>
+              </a:rPr>
+              <a:t>Step 1) Navigate to “Class Project\consoles” folder</a:t>
+            </a:r>
+            <a:endParaRPr sz="1800" b="1" dirty="0">
+              <a:solidFill>
+                <a:schemeClr val="accent1"/>
+              </a:solidFill>
+              <a:latin typeface="Lato"/>
+              <a:ea typeface="Lato"/>
+              <a:cs typeface="Lato"/>
+              <a:sym typeface="Lato"/>
+            </a:endParaRPr>
+          </a:p>
+          <a:p>
+            <a:pPr marL="0" lvl="0" indent="0" algn="l" rtl="0">
+              <a:lnSpc>
+                <a:spcPct val="80000"/>
+              </a:lnSpc>
+              <a:spcBef>
+                <a:spcPts val="820"/>
+              </a:spcBef>
+              <a:spcAft>
+                <a:spcPts val="0"/>
+              </a:spcAft>
+              <a:buNone/>
+            </a:pPr>
+            <a:endParaRPr sz="1800" b="1" dirty="0">
+              <a:solidFill>
+                <a:schemeClr val="accent1"/>
+              </a:solidFill>
+              <a:latin typeface="Lato"/>
+              <a:ea typeface="Lato"/>
+              <a:cs typeface="Lato"/>
+              <a:sym typeface="Lato"/>
+            </a:endParaRPr>
+          </a:p>
+          <a:p>
+            <a:pPr marL="0" lvl="0" indent="0" algn="l" rtl="0">
+              <a:lnSpc>
+                <a:spcPct val="80000"/>
+              </a:lnSpc>
+              <a:spcBef>
+                <a:spcPts val="820"/>
+              </a:spcBef>
+              <a:spcAft>
+                <a:spcPts val="0"/>
+              </a:spcAft>
+              <a:buNone/>
+            </a:pPr>
+            <a:r>
+              <a:rPr lang="en-US" sz="1800" b="1" dirty="0">
+                <a:solidFill>
+                  <a:schemeClr val="accent1"/>
+                </a:solidFill>
+                <a:latin typeface="Lato"/>
+                <a:ea typeface="Lato"/>
+                <a:cs typeface="Lato"/>
+                <a:sym typeface="Lato"/>
+              </a:rPr>
+              <a:t>Step 2) Open the “</a:t>
+            </a:r>
+            <a:r>
+              <a:rPr lang="en-US" sz="1800" b="1" dirty="0" err="1">
+                <a:solidFill>
+                  <a:schemeClr val="accent1"/>
+                </a:solidFill>
+                <a:latin typeface="Lato"/>
+                <a:ea typeface="Lato"/>
+                <a:cs typeface="Lato"/>
+                <a:sym typeface="Lato"/>
+              </a:rPr>
+              <a:t>console_games_import.sql</a:t>
+            </a:r>
+            <a:r>
+              <a:rPr lang="en-US" sz="1800" b="1" dirty="0">
+                <a:solidFill>
+                  <a:schemeClr val="accent1"/>
+                </a:solidFill>
+                <a:latin typeface="Lato"/>
+                <a:ea typeface="Lato"/>
+                <a:cs typeface="Lato"/>
+                <a:sym typeface="Lato"/>
+              </a:rPr>
+              <a:t>” file</a:t>
+            </a:r>
+            <a:endParaRPr sz="1800" b="1" dirty="0">
+              <a:solidFill>
+                <a:schemeClr val="accent1"/>
+              </a:solidFill>
+              <a:latin typeface="Lato"/>
+              <a:ea typeface="Lato"/>
+              <a:cs typeface="Lato"/>
+              <a:sym typeface="Lato"/>
+            </a:endParaRPr>
+          </a:p>
+          <a:p>
+            <a:pPr marL="0" lvl="0" indent="0" algn="l" rtl="0">
+              <a:lnSpc>
+                <a:spcPct val="80000"/>
+              </a:lnSpc>
+              <a:spcBef>
+                <a:spcPts val="820"/>
+              </a:spcBef>
+              <a:spcAft>
+                <a:spcPts val="0"/>
+              </a:spcAft>
+              <a:buNone/>
+            </a:pPr>
+            <a:endParaRPr sz="1800" b="1" dirty="0">
+              <a:solidFill>
+                <a:schemeClr val="accent1"/>
+              </a:solidFill>
+              <a:latin typeface="Lato"/>
+              <a:ea typeface="Lato"/>
+              <a:cs typeface="Lato"/>
+              <a:sym typeface="Lato"/>
+            </a:endParaRPr>
+          </a:p>
+          <a:p>
+            <a:pPr marL="0" lvl="0" indent="0" algn="l" rtl="0">
+              <a:lnSpc>
+                <a:spcPct val="80000"/>
+              </a:lnSpc>
+              <a:spcBef>
+                <a:spcPts val="820"/>
+              </a:spcBef>
+              <a:spcAft>
+                <a:spcPts val="0"/>
+              </a:spcAft>
+              <a:buNone/>
+            </a:pPr>
+            <a:r>
+              <a:rPr lang="en-US" sz="1800" b="1" dirty="0">
+                <a:solidFill>
+                  <a:schemeClr val="accent1"/>
+                </a:solidFill>
+                <a:latin typeface="Lato"/>
+                <a:ea typeface="Lato"/>
+                <a:cs typeface="Lato"/>
+                <a:sym typeface="Lato"/>
+              </a:rPr>
+              <a:t>Step 3) Read and execute directions in file</a:t>
+            </a:r>
+            <a:endParaRPr sz="1800" b="1" dirty="0">
+              <a:solidFill>
+                <a:schemeClr val="accent1"/>
+              </a:solidFill>
+              <a:latin typeface="Lato"/>
+              <a:ea typeface="Lato"/>
+              <a:cs typeface="Lato"/>
+              <a:sym typeface="Lato"/>
+            </a:endParaRPr>
+          </a:p>
+          <a:p>
+            <a:pPr marL="0" lvl="0" indent="0" algn="l" rtl="0">
+              <a:lnSpc>
+                <a:spcPct val="80000"/>
+              </a:lnSpc>
+              <a:spcBef>
+                <a:spcPts val="820"/>
+              </a:spcBef>
+              <a:spcAft>
+                <a:spcPts val="0"/>
+              </a:spcAft>
+              <a:buNone/>
+            </a:pPr>
+            <a:endParaRPr sz="1800" b="1" dirty="0">
+              <a:solidFill>
+                <a:schemeClr val="accent1"/>
+              </a:solidFill>
+              <a:latin typeface="Lato"/>
+              <a:ea typeface="Lato"/>
+              <a:cs typeface="Lato"/>
+              <a:sym typeface="Lato"/>
+            </a:endParaRPr>
+          </a:p>
+          <a:p>
+            <a:pPr marL="0" marR="0" lvl="0" indent="0" algn="l" rtl="0">
+              <a:lnSpc>
+                <a:spcPct val="80000"/>
+              </a:lnSpc>
+              <a:spcBef>
+                <a:spcPts val="820"/>
+              </a:spcBef>
+              <a:spcAft>
+                <a:spcPts val="0"/>
+              </a:spcAft>
+              <a:buNone/>
+            </a:pPr>
+            <a:endParaRPr dirty="0"/>
+          </a:p>
+        </p:txBody>
+      </p:sp>
+      <p:sp>
+        <p:nvSpPr>
+          <p:cNvPr id="217" name="Google Shape;217;p33"/>
+          <p:cNvSpPr txBox="1"/>
+          <p:nvPr/>
+        </p:nvSpPr>
+        <p:spPr>
+          <a:xfrm>
+            <a:off x="1019150" y="1677750"/>
+            <a:ext cx="10353900" cy="700800"/>
+          </a:xfrm>
+          <a:prstGeom prst="rect">
+            <a:avLst/>
+          </a:prstGeom>
+          <a:noFill/>
+          <a:ln>
+            <a:noFill/>
+          </a:ln>
+        </p:spPr>
+        <p:txBody>
+          <a:bodyPr spcFirstLastPara="1" wrap="square" lIns="91425" tIns="91425" rIns="91425" bIns="91425" anchor="t" anchorCtr="0">
+            <a:noAutofit/>
+          </a:bodyPr>
+          <a:lstStyle/>
+          <a:p>
+            <a:pPr marL="0" lvl="0" indent="0" algn="l" rtl="0">
+              <a:lnSpc>
+                <a:spcPct val="80000"/>
+              </a:lnSpc>
+              <a:spcBef>
+                <a:spcPts val="820"/>
+              </a:spcBef>
+              <a:spcAft>
+                <a:spcPts val="0"/>
+              </a:spcAft>
+              <a:buNone/>
+            </a:pPr>
+            <a:r>
+              <a:rPr lang="en-US" sz="1800" b="1" u="sng" dirty="0">
+                <a:solidFill>
+                  <a:schemeClr val="accent1"/>
+                </a:solidFill>
+                <a:latin typeface="Lato"/>
+                <a:ea typeface="Lato"/>
+                <a:cs typeface="Lato"/>
+                <a:sym typeface="Lato"/>
+              </a:rPr>
+              <a:t>Problem Statement</a:t>
+            </a:r>
+            <a:r>
+              <a:rPr lang="en-US" sz="1800" b="1" dirty="0">
+                <a:solidFill>
+                  <a:schemeClr val="accent1"/>
+                </a:solidFill>
+                <a:latin typeface="Lato"/>
+                <a:ea typeface="Lato"/>
+                <a:cs typeface="Lato"/>
+                <a:sym typeface="Lato"/>
+              </a:rPr>
+              <a:t>  </a:t>
+            </a:r>
+            <a:endParaRPr sz="1800" b="1" dirty="0">
+              <a:solidFill>
+                <a:schemeClr val="accent1"/>
+              </a:solidFill>
+              <a:latin typeface="Lato"/>
+              <a:ea typeface="Lato"/>
+              <a:cs typeface="Lato"/>
+              <a:sym typeface="Lato"/>
+            </a:endParaRPr>
+          </a:p>
+          <a:p>
+            <a:pPr marL="0" lvl="0" indent="0" algn="l" rtl="0">
+              <a:lnSpc>
+                <a:spcPct val="80000"/>
+              </a:lnSpc>
+              <a:spcBef>
+                <a:spcPts val="820"/>
+              </a:spcBef>
+              <a:spcAft>
+                <a:spcPts val="0"/>
+              </a:spcAft>
+              <a:buNone/>
+            </a:pPr>
+            <a:r>
+              <a:rPr lang="en-US" sz="1800" b="1" dirty="0">
+                <a:solidFill>
+                  <a:schemeClr val="accent1"/>
+                </a:solidFill>
+                <a:latin typeface="Lato"/>
+                <a:ea typeface="Lato"/>
+                <a:cs typeface="Lato"/>
+                <a:sym typeface="Lato"/>
+              </a:rPr>
+              <a:t>The senior leadership team at “</a:t>
+            </a:r>
+            <a:r>
+              <a:rPr lang="en-US" sz="1800" b="1" dirty="0" err="1">
+                <a:solidFill>
+                  <a:schemeClr val="accent1"/>
+                </a:solidFill>
+                <a:latin typeface="Lato"/>
+                <a:ea typeface="Lato"/>
+                <a:cs typeface="Lato"/>
+                <a:sym typeface="Lato"/>
+              </a:rPr>
+              <a:t>NameCo</a:t>
+            </a:r>
+            <a:r>
+              <a:rPr lang="en-US" sz="1800" b="1" dirty="0">
+                <a:solidFill>
+                  <a:schemeClr val="accent1"/>
+                </a:solidFill>
+                <a:latin typeface="Lato"/>
+                <a:ea typeface="Lato"/>
+                <a:cs typeface="Lato"/>
+                <a:sym typeface="Lato"/>
+              </a:rPr>
+              <a:t>, Inc” would like to create a new smash-hit video game, intended for the hand-held console market.   After much brainstorming, the CEO declares that “People love drama, so let’s create a new “Barbie Adventure Game”!” </a:t>
+            </a:r>
+            <a:endParaRPr sz="1800" b="1" dirty="0">
+              <a:solidFill>
+                <a:schemeClr val="accent1"/>
+              </a:solidFill>
+              <a:latin typeface="Lato"/>
+              <a:ea typeface="Lato"/>
+              <a:cs typeface="Lato"/>
+              <a:sym typeface="Lato"/>
+            </a:endParaRPr>
+          </a:p>
+          <a:p>
+            <a:pPr marL="0" lvl="0" indent="0" algn="l" rtl="0">
+              <a:lnSpc>
+                <a:spcPct val="80000"/>
+              </a:lnSpc>
+              <a:spcBef>
+                <a:spcPts val="820"/>
+              </a:spcBef>
+              <a:spcAft>
+                <a:spcPts val="0"/>
+              </a:spcAft>
+              <a:buNone/>
+            </a:pPr>
+            <a:endParaRPr sz="1800" b="1" dirty="0">
+              <a:solidFill>
+                <a:schemeClr val="accent1"/>
+              </a:solidFill>
+              <a:latin typeface="Lato"/>
+              <a:ea typeface="Lato"/>
+              <a:cs typeface="Lato"/>
+              <a:sym typeface="Lato"/>
+            </a:endParaRPr>
+          </a:p>
+          <a:p>
+            <a:pPr marL="0" lvl="0" indent="0" algn="l" rtl="0">
+              <a:lnSpc>
+                <a:spcPct val="80000"/>
+              </a:lnSpc>
+              <a:spcBef>
+                <a:spcPts val="820"/>
+              </a:spcBef>
+              <a:spcAft>
+                <a:spcPts val="0"/>
+              </a:spcAft>
+              <a:buNone/>
+            </a:pPr>
+            <a:r>
+              <a:rPr lang="en-US" sz="1800" b="1" dirty="0">
+                <a:solidFill>
+                  <a:schemeClr val="accent1"/>
+                </a:solidFill>
+                <a:latin typeface="Lato"/>
+                <a:ea typeface="Lato"/>
+                <a:cs typeface="Lato"/>
+                <a:sym typeface="Lato"/>
+              </a:rPr>
+              <a:t>After the meeting, there was an uneasy feeling about investing in a “Barbie Adventure Game”.   Did historical sales information support this claim, or is the CEO just going from his “gut feeling”?  As an analyst, the COO has assigned you a project to gather, store historical gaming console data.  Additionally, the COO would like to create an information dashboard that supports/refutes this claim, using market information you’ve been asked to gather.  </a:t>
+            </a:r>
+            <a:endParaRPr sz="1800" b="1" dirty="0">
+              <a:solidFill>
+                <a:schemeClr val="accent1"/>
+              </a:solidFill>
+              <a:latin typeface="Lato"/>
+              <a:ea typeface="Lato"/>
+              <a:cs typeface="Lato"/>
+              <a:sym typeface="Lato"/>
+            </a:endParaRPr>
+          </a:p>
+          <a:p>
+            <a:pPr marL="457200" lvl="0" indent="0" algn="l" rtl="0">
+              <a:lnSpc>
+                <a:spcPct val="80000"/>
+              </a:lnSpc>
+              <a:spcBef>
+                <a:spcPts val="820"/>
+              </a:spcBef>
+              <a:spcAft>
+                <a:spcPts val="0"/>
+              </a:spcAft>
+              <a:buNone/>
+            </a:pPr>
+            <a:endParaRPr sz="1800" b="1" dirty="0">
+              <a:solidFill>
+                <a:schemeClr val="accent1"/>
+              </a:solidFill>
+              <a:latin typeface="Lato"/>
+              <a:ea typeface="Lato"/>
+              <a:cs typeface="Lato"/>
+              <a:sym typeface="Lato"/>
+            </a:endParaRPr>
+          </a:p>
+          <a:p>
+            <a:pPr marL="457200" lvl="0" indent="0" algn="l" rtl="0">
+              <a:lnSpc>
+                <a:spcPct val="80000"/>
+              </a:lnSpc>
+              <a:spcBef>
+                <a:spcPts val="820"/>
+              </a:spcBef>
+              <a:spcAft>
+                <a:spcPts val="0"/>
+              </a:spcAft>
+              <a:buNone/>
+            </a:pPr>
+            <a:r>
+              <a:rPr lang="en-US" sz="1800" b="1" dirty="0">
+                <a:solidFill>
+                  <a:schemeClr val="accent1"/>
+                </a:solidFill>
+                <a:latin typeface="Lato"/>
+                <a:ea typeface="Lato"/>
+                <a:cs typeface="Lato"/>
+                <a:sym typeface="Lato"/>
+              </a:rPr>
+              <a:t>  </a:t>
+            </a:r>
+            <a:endParaRPr sz="1800" b="1" dirty="0">
+              <a:solidFill>
+                <a:schemeClr val="accent1"/>
+              </a:solidFill>
+              <a:latin typeface="Lato"/>
+              <a:ea typeface="Lato"/>
+              <a:cs typeface="Lato"/>
+              <a:sym typeface="Lato"/>
+            </a:endParaRPr>
+          </a:p>
+          <a:p>
+            <a:pPr marL="0" marR="0" lvl="0" indent="0" algn="l" rtl="0">
+              <a:lnSpc>
+                <a:spcPct val="80000"/>
+              </a:lnSpc>
+              <a:spcBef>
+                <a:spcPts val="820"/>
+              </a:spcBef>
+              <a:spcAft>
+                <a:spcPts val="0"/>
+              </a:spcAft>
+              <a:buNone/>
+            </a:pPr>
+            <a:endParaRPr dirty="0"/>
+          </a:p>
+        </p:txBody>
+      </p:sp>
+      <p:sp>
+        <p:nvSpPr>
+          <p:cNvPr id="218" name="Google Shape;218;p33"/>
+          <p:cNvSpPr txBox="1"/>
+          <p:nvPr/>
+        </p:nvSpPr>
+        <p:spPr>
+          <a:xfrm>
+            <a:off x="1019150" y="4556600"/>
+            <a:ext cx="5205600" cy="700800"/>
+          </a:xfrm>
+          <a:prstGeom prst="rect">
+            <a:avLst/>
+          </a:prstGeom>
+          <a:noFill/>
+          <a:ln>
+            <a:noFill/>
+          </a:ln>
+        </p:spPr>
+        <p:txBody>
+          <a:bodyPr spcFirstLastPara="1" wrap="square" lIns="91425" tIns="91425" rIns="91425" bIns="91425" anchor="t" anchorCtr="0">
+            <a:noAutofit/>
+          </a:bodyPr>
+          <a:lstStyle/>
+          <a:p>
+            <a:pPr marL="0" lvl="0" indent="0" algn="l" rtl="0">
+              <a:lnSpc>
+                <a:spcPct val="80000"/>
+              </a:lnSpc>
+              <a:spcBef>
+                <a:spcPts val="820"/>
+              </a:spcBef>
+              <a:spcAft>
+                <a:spcPts val="0"/>
+              </a:spcAft>
+              <a:buNone/>
+            </a:pPr>
+            <a:r>
+              <a:rPr lang="en-US" sz="1800" b="1" u="sng" dirty="0">
+                <a:solidFill>
+                  <a:schemeClr val="accent1"/>
+                </a:solidFill>
+                <a:latin typeface="Lato"/>
+                <a:ea typeface="Lato"/>
+                <a:cs typeface="Lato"/>
+                <a:sym typeface="Lato"/>
+              </a:rPr>
+              <a:t>Project Goal(s)</a:t>
+            </a:r>
+            <a:r>
+              <a:rPr lang="en-US" sz="1800" b="1" dirty="0">
+                <a:solidFill>
+                  <a:schemeClr val="accent1"/>
+                </a:solidFill>
+                <a:latin typeface="Lato"/>
+                <a:ea typeface="Lato"/>
+                <a:cs typeface="Lato"/>
+                <a:sym typeface="Lato"/>
+              </a:rPr>
+              <a:t>:  </a:t>
+            </a:r>
+            <a:endParaRPr sz="1800" b="1" dirty="0">
+              <a:solidFill>
+                <a:schemeClr val="accent1"/>
+              </a:solidFill>
+              <a:latin typeface="Lato"/>
+              <a:ea typeface="Lato"/>
+              <a:cs typeface="Lato"/>
+              <a:sym typeface="Lato"/>
+            </a:endParaRPr>
+          </a:p>
+          <a:p>
+            <a:pPr marL="457200" lvl="0" indent="-342900" algn="l" rtl="0">
+              <a:lnSpc>
+                <a:spcPct val="80000"/>
+              </a:lnSpc>
+              <a:spcBef>
+                <a:spcPts val="820"/>
+              </a:spcBef>
+              <a:spcAft>
+                <a:spcPts val="0"/>
+              </a:spcAft>
+              <a:buClr>
+                <a:schemeClr val="accent1"/>
+              </a:buClr>
+              <a:buSzPts val="1800"/>
+              <a:buFont typeface="Lato"/>
+              <a:buAutoNum type="arabicParenR"/>
+            </a:pPr>
+            <a:r>
+              <a:rPr lang="en-US" sz="1800" b="1" dirty="0">
+                <a:solidFill>
+                  <a:schemeClr val="accent1"/>
+                </a:solidFill>
+                <a:latin typeface="Lato"/>
+                <a:ea typeface="Lato"/>
+                <a:cs typeface="Lato"/>
+                <a:sym typeface="Lato"/>
+              </a:rPr>
+              <a:t>Create a dynamic information dashboard that provides senior management insight into the video game console market. </a:t>
+            </a:r>
+            <a:endParaRPr sz="1800" b="1" dirty="0">
+              <a:solidFill>
+                <a:schemeClr val="accent1"/>
+              </a:solidFill>
+              <a:latin typeface="Lato"/>
+              <a:ea typeface="Lato"/>
+              <a:cs typeface="Lato"/>
+              <a:sym typeface="Lato"/>
+            </a:endParaRPr>
+          </a:p>
+          <a:p>
+            <a:pPr marL="457200" lvl="0" indent="0" algn="l" rtl="0">
+              <a:lnSpc>
+                <a:spcPct val="80000"/>
+              </a:lnSpc>
+              <a:spcBef>
+                <a:spcPts val="820"/>
+              </a:spcBef>
+              <a:spcAft>
+                <a:spcPts val="0"/>
+              </a:spcAft>
+              <a:buNone/>
+            </a:pPr>
+            <a:endParaRPr sz="1800" b="1" dirty="0">
+              <a:solidFill>
+                <a:schemeClr val="accent1"/>
+              </a:solidFill>
+              <a:latin typeface="Lato"/>
+              <a:ea typeface="Lato"/>
+              <a:cs typeface="Lato"/>
+              <a:sym typeface="Lato"/>
+            </a:endParaRPr>
+          </a:p>
+          <a:p>
+            <a:pPr marL="457200" lvl="0" indent="-342900" algn="l" rtl="0">
+              <a:lnSpc>
+                <a:spcPct val="80000"/>
+              </a:lnSpc>
+              <a:spcBef>
+                <a:spcPts val="820"/>
+              </a:spcBef>
+              <a:spcAft>
+                <a:spcPts val="0"/>
+              </a:spcAft>
+              <a:buClr>
+                <a:schemeClr val="accent1"/>
+              </a:buClr>
+              <a:buSzPts val="1800"/>
+              <a:buFont typeface="Lato"/>
+              <a:buAutoNum type="arabicParenR"/>
+            </a:pPr>
+            <a:r>
+              <a:rPr lang="en-US" sz="1800" b="1" dirty="0">
+                <a:solidFill>
+                  <a:schemeClr val="accent1"/>
+                </a:solidFill>
+                <a:latin typeface="Lato"/>
+                <a:ea typeface="Lato"/>
+                <a:cs typeface="Lato"/>
+                <a:sym typeface="Lato"/>
+              </a:rPr>
+              <a:t>Create data structures that allow for the automated storage of future console/game information.   </a:t>
+            </a:r>
+            <a:endParaRPr sz="1800" b="1" dirty="0">
+              <a:solidFill>
+                <a:schemeClr val="accent1"/>
+              </a:solidFill>
+              <a:latin typeface="Lato"/>
+              <a:ea typeface="Lato"/>
+              <a:cs typeface="Lato"/>
+              <a:sym typeface="Lato"/>
+            </a:endParaRPr>
+          </a:p>
+          <a:p>
+            <a:pPr marL="0" marR="0" lvl="0" indent="0" algn="l" rtl="0">
+              <a:lnSpc>
+                <a:spcPct val="80000"/>
+              </a:lnSpc>
+              <a:spcBef>
+                <a:spcPts val="820"/>
+              </a:spcBef>
+              <a:spcAft>
+                <a:spcPts val="0"/>
+              </a:spcAft>
+              <a:buNone/>
+            </a:pPr>
+            <a:endParaRPr dirty="0"/>
+          </a:p>
+        </p:txBody>
+      </p:sp>
+    </p:spTree>
+  </p:cSld>
+  <p:clrMapOvr>
+    <a:masterClrMapping/>
+  </p:clrMapOvr>
+</p:sld>
+</file>
+
+<file path=ppt/slides/slide6.xml><?xml version="1.0" encoding="utf-8"?>
 <p:sld xmlns:a="http://schemas.openxmlformats.org/drawingml/2006/main" xmlns:r="http://schemas.openxmlformats.org/officeDocument/2006/relationships" xmlns:p="http://schemas.openxmlformats.org/presentationml/2006/main">
   <p:cSld>
     <p:spTree>
@@ -21228,8 +22861,8 @@
         </p:nvSpPr>
         <p:spPr>
           <a:xfrm>
-            <a:off x="1001545" y="1995724"/>
-            <a:ext cx="10353900" cy="4058700"/>
+            <a:off x="1001544" y="1995724"/>
+            <a:ext cx="10816207" cy="4058700"/>
           </a:xfrm>
           <a:prstGeom prst="rect">
             <a:avLst/>
@@ -21325,7 +22958,7 @@
                   <a:srgbClr val="000000"/>
                 </a:solidFill>
               </a:rPr>
-              <a:t>Storing/Joining data for analysis (Class 3-4)</a:t>
+              <a:t>Storing/Joining data for analysis (Class 4)</a:t>
             </a:r>
             <a:endParaRPr sz="2400" dirty="0">
               <a:solidFill>
@@ -21388,7 +23021,28 @@
                   <a:srgbClr val="000000"/>
                 </a:solidFill>
               </a:rPr>
-              <a:t>Normalize Data &amp; Create Data Model (Class 6)</a:t>
+              <a:t>Create Automated Processes using Stored Procedures &amp; Functions (Class 6)</a:t>
+            </a:r>
+          </a:p>
+          <a:p>
+            <a:pPr marL="494098" indent="-494098">
+              <a:spcBef>
+                <a:spcPts val="1000"/>
+              </a:spcBef>
+              <a:buClr>
+                <a:srgbClr val="000000"/>
+              </a:buClr>
+              <a:buSzPts val="2400"/>
+              <a:buFont typeface="Lustria"/>
+              <a:buAutoNum type="arabicPeriod"/>
+            </a:pPr>
+            <a:r>
+              <a:rPr lang="en-US" sz="2400" dirty="0">
+                <a:solidFill>
+                  <a:srgbClr val="000000"/>
+                </a:solidFill>
+              </a:rPr>
+              <a:t>Normalize Data &amp; Create Data Model (Class 7)</a:t>
             </a:r>
             <a:endParaRPr sz="2400" dirty="0">
               <a:solidFill>
@@ -21420,7 +23074,7 @@
                   <a:srgbClr val="000000"/>
                 </a:solidFill>
               </a:rPr>
-              <a:t>Analyze Data Quality &amp; Create Data Dictionary (Class 7) </a:t>
+              <a:t>Analyze Data Quality &amp; Create Data Dictionary (Class 8) </a:t>
             </a:r>
             <a:endParaRPr sz="2400" dirty="0">
               <a:solidFill>
@@ -21452,7 +23106,7 @@
                   <a:srgbClr val="000000"/>
                 </a:solidFill>
               </a:rPr>
-              <a:t>Connect Data to </a:t>
+              <a:t>Finalize Project - Connect MySQL to </a:t>
             </a:r>
             <a:r>
               <a:rPr lang="en-US" sz="2400" dirty="0" err="1">
@@ -21468,7 +23122,7 @@
                   <a:srgbClr val="000000"/>
                 </a:solidFill>
               </a:rPr>
-              <a:t> Desktop/Cloud, Answer Business Questions Automate data workflow using ETL (Python - Optional) (Class 8)</a:t>
+              <a:t> Cloud, Answer Business Questions (Class 8)</a:t>
             </a:r>
             <a:endParaRPr sz="2400" dirty="0">
               <a:solidFill>
@@ -21486,786 +23140,7 @@
 </p:sld>
 </file>
 
-<file path=ppt/slides/slide4.xml><?xml version="1.0" encoding="utf-8"?>
-<p:sld xmlns:a="http://schemas.openxmlformats.org/drawingml/2006/main" xmlns:r="http://schemas.openxmlformats.org/officeDocument/2006/relationships" xmlns:p="http://schemas.openxmlformats.org/presentationml/2006/main">
-  <p:cSld>
-    <p:spTree>
-      <p:nvGrpSpPr>
-        <p:cNvPr id="1" name="Shape 196"/>
-        <p:cNvGrpSpPr/>
-        <p:nvPr/>
-      </p:nvGrpSpPr>
-      <p:grpSpPr>
-        <a:xfrm>
-          <a:off x="0" y="0"/>
-          <a:ext cx="0" cy="0"/>
-          <a:chOff x="0" y="0"/>
-          <a:chExt cx="0" cy="0"/>
-        </a:xfrm>
-      </p:grpSpPr>
-      <p:sp>
-        <p:nvSpPr>
-          <p:cNvPr id="197" name="Google Shape;197;p30"/>
-          <p:cNvSpPr txBox="1">
-            <a:spLocks noGrp="1"/>
-          </p:cNvSpPr>
-          <p:nvPr>
-            <p:ph type="title" idx="4294967295"/>
-          </p:nvPr>
-        </p:nvSpPr>
-        <p:spPr>
-          <a:xfrm>
-            <a:off x="913795" y="609600"/>
-            <a:ext cx="10353900" cy="970500"/>
-          </a:xfrm>
-          <a:prstGeom prst="rect">
-            <a:avLst/>
-          </a:prstGeom>
-          <a:noFill/>
-          <a:ln>
-            <a:noFill/>
-          </a:ln>
-          <a:effectLst>
-            <a:outerShdw blurRad="25400">
-              <a:srgbClr val="000000">
-                <a:alpha val="45880"/>
-              </a:srgbClr>
-            </a:outerShdw>
-          </a:effectLst>
-        </p:spPr>
-        <p:txBody>
-          <a:bodyPr spcFirstLastPara="1" wrap="square" lIns="91425" tIns="45700" rIns="91425" bIns="45700" anchor="ctr" anchorCtr="0">
-            <a:noAutofit/>
-          </a:bodyPr>
-          <a:lstStyle/>
-          <a:p>
-            <a:pPr marL="0" lvl="0" indent="0" algn="l" rtl="0">
-              <a:spcBef>
-                <a:spcPts val="0"/>
-              </a:spcBef>
-              <a:spcAft>
-                <a:spcPts val="0"/>
-              </a:spcAft>
-              <a:buClr>
-                <a:schemeClr val="lt2"/>
-              </a:buClr>
-              <a:buSzPts val="4000"/>
-              <a:buFont typeface="Lustria"/>
-              <a:buNone/>
-            </a:pPr>
-            <a:r>
-              <a:rPr lang="en-US"/>
-              <a:t>Business Questions</a:t>
-            </a:r>
-            <a:endParaRPr/>
-          </a:p>
-        </p:txBody>
-      </p:sp>
-      <p:sp>
-        <p:nvSpPr>
-          <p:cNvPr id="198" name="Google Shape;198;p30"/>
-          <p:cNvSpPr txBox="1">
-            <a:spLocks noGrp="1"/>
-          </p:cNvSpPr>
-          <p:nvPr>
-            <p:ph type="body" idx="4294967295"/>
-          </p:nvPr>
-        </p:nvSpPr>
-        <p:spPr>
-          <a:xfrm>
-            <a:off x="913795" y="1732449"/>
-            <a:ext cx="10353900" cy="4058700"/>
-          </a:xfrm>
-          <a:prstGeom prst="rect">
-            <a:avLst/>
-          </a:prstGeom>
-          <a:noFill/>
-          <a:ln>
-            <a:noFill/>
-          </a:ln>
-          <a:effectLst>
-            <a:outerShdw blurRad="25400">
-              <a:srgbClr val="000000">
-                <a:alpha val="45880"/>
-              </a:srgbClr>
-            </a:outerShdw>
-          </a:effectLst>
-        </p:spPr>
-        <p:txBody>
-          <a:bodyPr spcFirstLastPara="1" wrap="square" lIns="91425" tIns="45700" rIns="91425" bIns="45700" anchor="t" anchorCtr="0">
-            <a:noAutofit/>
-          </a:bodyPr>
-          <a:lstStyle/>
-          <a:p>
-            <a:pPr marL="342900" lvl="0" indent="-369500" algn="l" rtl="0">
-              <a:spcBef>
-                <a:spcPts val="0"/>
-              </a:spcBef>
-              <a:spcAft>
-                <a:spcPts val="0"/>
-              </a:spcAft>
-              <a:buSzPts val="2400"/>
-              <a:buChar char="●"/>
-            </a:pPr>
-            <a:r>
-              <a:rPr lang="en-US" sz="2400"/>
-              <a:t>Useful questions often require basic domain knowledge</a:t>
-            </a:r>
-            <a:endParaRPr sz="2400"/>
-          </a:p>
-          <a:p>
-            <a:pPr marL="342900" lvl="0" indent="-217100" algn="l" rtl="0">
-              <a:spcBef>
-                <a:spcPts val="1000"/>
-              </a:spcBef>
-              <a:spcAft>
-                <a:spcPts val="0"/>
-              </a:spcAft>
-              <a:buSzPts val="1400"/>
-              <a:buNone/>
-            </a:pPr>
-            <a:endParaRPr sz="2400"/>
-          </a:p>
-          <a:p>
-            <a:pPr marL="342900" lvl="0" indent="-369500" algn="l" rtl="0">
-              <a:spcBef>
-                <a:spcPts val="1000"/>
-              </a:spcBef>
-              <a:spcAft>
-                <a:spcPts val="0"/>
-              </a:spcAft>
-              <a:buSzPts val="2400"/>
-              <a:buChar char="●"/>
-            </a:pPr>
-            <a:r>
-              <a:rPr lang="en-US" sz="2400"/>
-              <a:t>Characteristics of effective questions</a:t>
-            </a:r>
-            <a:endParaRPr sz="2400"/>
-          </a:p>
-          <a:p>
-            <a:pPr marL="719999" lvl="1" indent="-342389" algn="l" rtl="0">
-              <a:spcBef>
-                <a:spcPts val="960"/>
-              </a:spcBef>
-              <a:spcAft>
-                <a:spcPts val="0"/>
-              </a:spcAft>
-              <a:buSzPts val="2400"/>
-              <a:buChar char="○"/>
-            </a:pPr>
-            <a:r>
-              <a:rPr lang="en-US" sz="2400"/>
-              <a:t>Lead to action</a:t>
-            </a:r>
-            <a:endParaRPr sz="2400"/>
-          </a:p>
-          <a:p>
-            <a:pPr marL="719999" lvl="1" indent="-342389" algn="l" rtl="0">
-              <a:spcBef>
-                <a:spcPts val="960"/>
-              </a:spcBef>
-              <a:spcAft>
-                <a:spcPts val="0"/>
-              </a:spcAft>
-              <a:buSzPts val="2400"/>
-              <a:buChar char="○"/>
-            </a:pPr>
-            <a:r>
-              <a:rPr lang="en-US" sz="2400"/>
-              <a:t>Are specific</a:t>
-            </a:r>
-            <a:endParaRPr sz="2400"/>
-          </a:p>
-          <a:p>
-            <a:pPr marL="719999" lvl="1" indent="-342389" algn="l" rtl="0">
-              <a:spcBef>
-                <a:spcPts val="960"/>
-              </a:spcBef>
-              <a:spcAft>
-                <a:spcPts val="0"/>
-              </a:spcAft>
-              <a:buSzPts val="2400"/>
-              <a:buChar char="○"/>
-            </a:pPr>
-            <a:r>
-              <a:rPr lang="en-US" sz="2400"/>
-              <a:t>Clarify understanding</a:t>
-            </a:r>
-            <a:endParaRPr sz="2400"/>
-          </a:p>
-          <a:p>
-            <a:pPr marL="719999" lvl="1" indent="-342389" algn="l" rtl="0">
-              <a:spcBef>
-                <a:spcPts val="960"/>
-              </a:spcBef>
-              <a:spcAft>
-                <a:spcPts val="0"/>
-              </a:spcAft>
-              <a:buSzPts val="2400"/>
-              <a:buChar char="○"/>
-            </a:pPr>
-            <a:r>
-              <a:rPr lang="en-US" sz="2400"/>
-              <a:t>Focus on important features</a:t>
-            </a:r>
-            <a:endParaRPr sz="2400"/>
-          </a:p>
-          <a:p>
-            <a:pPr marL="719999" lvl="1" indent="-342389" algn="l" rtl="0">
-              <a:spcBef>
-                <a:spcPts val="960"/>
-              </a:spcBef>
-              <a:spcAft>
-                <a:spcPts val="0"/>
-              </a:spcAft>
-              <a:buSzPts val="2400"/>
-              <a:buChar char="○"/>
-            </a:pPr>
-            <a:r>
-              <a:rPr lang="en-US" sz="2400"/>
-              <a:t>Expose underlying issues</a:t>
-            </a:r>
-            <a:endParaRPr sz="2400"/>
-          </a:p>
-          <a:p>
-            <a:pPr marL="342900" lvl="0" indent="-217100" algn="l" rtl="0">
-              <a:spcBef>
-                <a:spcPts val="1000"/>
-              </a:spcBef>
-              <a:spcAft>
-                <a:spcPts val="0"/>
-              </a:spcAft>
-              <a:buSzPts val="1400"/>
-              <a:buNone/>
-            </a:pPr>
-            <a:endParaRPr sz="2400"/>
-          </a:p>
-          <a:p>
-            <a:pPr marL="342900" lvl="0" indent="-217100" algn="l" rtl="0">
-              <a:spcBef>
-                <a:spcPts val="1000"/>
-              </a:spcBef>
-              <a:spcAft>
-                <a:spcPts val="0"/>
-              </a:spcAft>
-              <a:buSzPts val="1400"/>
-              <a:buNone/>
-            </a:pPr>
-            <a:endParaRPr/>
-          </a:p>
-        </p:txBody>
-      </p:sp>
-    </p:spTree>
-  </p:cSld>
-  <p:clrMapOvr>
-    <a:masterClrMapping/>
-  </p:clrMapOvr>
-</p:sld>
-</file>
-
-<file path=ppt/slides/slide5.xml><?xml version="1.0" encoding="utf-8"?>
-<p:sld xmlns:a="http://schemas.openxmlformats.org/drawingml/2006/main" xmlns:r="http://schemas.openxmlformats.org/officeDocument/2006/relationships" xmlns:p="http://schemas.openxmlformats.org/presentationml/2006/main">
-  <p:cSld>
-    <p:spTree>
-      <p:nvGrpSpPr>
-        <p:cNvPr id="1" name="Shape 202"/>
-        <p:cNvGrpSpPr/>
-        <p:nvPr/>
-      </p:nvGrpSpPr>
-      <p:grpSpPr>
-        <a:xfrm>
-          <a:off x="0" y="0"/>
-          <a:ext cx="0" cy="0"/>
-          <a:chOff x="0" y="0"/>
-          <a:chExt cx="0" cy="0"/>
-        </a:xfrm>
-      </p:grpSpPr>
-      <p:sp>
-        <p:nvSpPr>
-          <p:cNvPr id="203" name="Google Shape;203;p31"/>
-          <p:cNvSpPr txBox="1">
-            <a:spLocks noGrp="1"/>
-          </p:cNvSpPr>
-          <p:nvPr>
-            <p:ph type="title" idx="4294967295"/>
-          </p:nvPr>
-        </p:nvSpPr>
-        <p:spPr>
-          <a:xfrm>
-            <a:off x="913795" y="609600"/>
-            <a:ext cx="10353900" cy="970500"/>
-          </a:xfrm>
-          <a:prstGeom prst="rect">
-            <a:avLst/>
-          </a:prstGeom>
-          <a:noFill/>
-          <a:ln>
-            <a:noFill/>
-          </a:ln>
-          <a:effectLst>
-            <a:outerShdw blurRad="25400">
-              <a:srgbClr val="000000">
-                <a:alpha val="45880"/>
-              </a:srgbClr>
-            </a:outerShdw>
-          </a:effectLst>
-        </p:spPr>
-        <p:txBody>
-          <a:bodyPr spcFirstLastPara="1" wrap="square" lIns="91425" tIns="45700" rIns="91425" bIns="45700" anchor="ctr" anchorCtr="0">
-            <a:noAutofit/>
-          </a:bodyPr>
-          <a:lstStyle/>
-          <a:p>
-            <a:pPr marL="0" lvl="0" indent="0" algn="l" rtl="0">
-              <a:spcBef>
-                <a:spcPts val="0"/>
-              </a:spcBef>
-              <a:spcAft>
-                <a:spcPts val="0"/>
-              </a:spcAft>
-              <a:buClr>
-                <a:schemeClr val="lt2"/>
-              </a:buClr>
-              <a:buSzPts val="4000"/>
-              <a:buFont typeface="Lustria"/>
-              <a:buNone/>
-            </a:pPr>
-            <a:r>
-              <a:rPr lang="en-US"/>
-              <a:t>Business Questions</a:t>
-            </a:r>
-            <a:endParaRPr/>
-          </a:p>
-        </p:txBody>
-      </p:sp>
-      <p:sp>
-        <p:nvSpPr>
-          <p:cNvPr id="204" name="Google Shape;204;p31"/>
-          <p:cNvSpPr txBox="1"/>
-          <p:nvPr/>
-        </p:nvSpPr>
-        <p:spPr>
-          <a:xfrm>
-            <a:off x="919050" y="1705100"/>
-            <a:ext cx="10353900" cy="3000000"/>
-          </a:xfrm>
-          <a:prstGeom prst="rect">
-            <a:avLst/>
-          </a:prstGeom>
-          <a:noFill/>
-          <a:ln>
-            <a:noFill/>
-          </a:ln>
-        </p:spPr>
-        <p:txBody>
-          <a:bodyPr spcFirstLastPara="1" wrap="square" lIns="91425" tIns="91425" rIns="91425" bIns="91425" anchor="t" anchorCtr="0">
-            <a:noAutofit/>
-          </a:bodyPr>
-          <a:lstStyle/>
-          <a:p>
-            <a:pPr marL="342900" lvl="0" indent="-344100" algn="l" rtl="0">
-              <a:lnSpc>
-                <a:spcPct val="115000"/>
-              </a:lnSpc>
-              <a:spcBef>
-                <a:spcPts val="0"/>
-              </a:spcBef>
-              <a:spcAft>
-                <a:spcPts val="0"/>
-              </a:spcAft>
-              <a:buClr>
-                <a:schemeClr val="accent1"/>
-              </a:buClr>
-              <a:buSzPts val="2000"/>
-              <a:buFont typeface="Lato"/>
-              <a:buChar char="●"/>
-            </a:pPr>
-            <a:r>
-              <a:rPr lang="en-US" sz="2000" b="1">
-                <a:solidFill>
-                  <a:schemeClr val="accent1"/>
-                </a:solidFill>
-                <a:latin typeface="Lato"/>
-                <a:ea typeface="Lato"/>
-                <a:cs typeface="Lato"/>
-                <a:sym typeface="Lato"/>
-              </a:rPr>
-              <a:t>Sales</a:t>
-            </a:r>
-            <a:endParaRPr sz="2000" b="1">
-              <a:solidFill>
-                <a:schemeClr val="accent1"/>
-              </a:solidFill>
-              <a:latin typeface="Lato"/>
-              <a:ea typeface="Lato"/>
-              <a:cs typeface="Lato"/>
-              <a:sym typeface="Lato"/>
-            </a:endParaRPr>
-          </a:p>
-          <a:p>
-            <a:pPr marL="719999" lvl="1" indent="-269999" algn="l" rtl="0">
-              <a:lnSpc>
-                <a:spcPct val="115000"/>
-              </a:lnSpc>
-              <a:spcBef>
-                <a:spcPts val="1000"/>
-              </a:spcBef>
-              <a:spcAft>
-                <a:spcPts val="0"/>
-              </a:spcAft>
-              <a:buClr>
-                <a:schemeClr val="accent1"/>
-              </a:buClr>
-              <a:buSzPts val="1400"/>
-              <a:buFont typeface="Lato"/>
-              <a:buChar char="○"/>
-            </a:pPr>
-            <a:r>
-              <a:rPr lang="en-US" sz="2000">
-                <a:solidFill>
-                  <a:schemeClr val="accent1"/>
-                </a:solidFill>
-                <a:latin typeface="Lato"/>
-                <a:ea typeface="Lato"/>
-                <a:cs typeface="Lato"/>
-                <a:sym typeface="Lato"/>
-              </a:rPr>
-              <a:t>How many people are seeing our ads?</a:t>
-            </a:r>
-            <a:endParaRPr sz="1500">
-              <a:solidFill>
-                <a:schemeClr val="accent1"/>
-              </a:solidFill>
-              <a:latin typeface="Lato"/>
-              <a:ea typeface="Lato"/>
-              <a:cs typeface="Lato"/>
-              <a:sym typeface="Lato"/>
-            </a:endParaRPr>
-          </a:p>
-          <a:p>
-            <a:pPr marL="719999" lvl="1" indent="-269999" algn="l" rtl="0">
-              <a:lnSpc>
-                <a:spcPct val="115000"/>
-              </a:lnSpc>
-              <a:spcBef>
-                <a:spcPts val="1000"/>
-              </a:spcBef>
-              <a:spcAft>
-                <a:spcPts val="0"/>
-              </a:spcAft>
-              <a:buClr>
-                <a:schemeClr val="accent1"/>
-              </a:buClr>
-              <a:buSzPts val="1400"/>
-              <a:buFont typeface="Lato"/>
-              <a:buChar char="○"/>
-            </a:pPr>
-            <a:r>
-              <a:rPr lang="en-US" sz="2000">
-                <a:solidFill>
-                  <a:schemeClr val="accent1"/>
-                </a:solidFill>
-                <a:latin typeface="Lato"/>
-                <a:ea typeface="Lato"/>
-                <a:cs typeface="Lato"/>
-                <a:sym typeface="Lato"/>
-              </a:rPr>
-              <a:t>What is our conversion rate?</a:t>
-            </a:r>
-            <a:endParaRPr sz="1500">
-              <a:solidFill>
-                <a:schemeClr val="accent1"/>
-              </a:solidFill>
-              <a:latin typeface="Lato"/>
-              <a:ea typeface="Lato"/>
-              <a:cs typeface="Lato"/>
-              <a:sym typeface="Lato"/>
-            </a:endParaRPr>
-          </a:p>
-          <a:p>
-            <a:pPr marL="719999" lvl="1" indent="-269999" algn="l" rtl="0">
-              <a:lnSpc>
-                <a:spcPct val="115000"/>
-              </a:lnSpc>
-              <a:spcBef>
-                <a:spcPts val="1000"/>
-              </a:spcBef>
-              <a:spcAft>
-                <a:spcPts val="0"/>
-              </a:spcAft>
-              <a:buClr>
-                <a:schemeClr val="accent1"/>
-              </a:buClr>
-              <a:buSzPts val="1400"/>
-              <a:buFont typeface="Lato"/>
-              <a:buChar char="○"/>
-            </a:pPr>
-            <a:r>
-              <a:rPr lang="en-US" sz="2000">
-                <a:solidFill>
-                  <a:schemeClr val="accent1"/>
-                </a:solidFill>
-                <a:latin typeface="Lato"/>
-                <a:ea typeface="Lato"/>
-                <a:cs typeface="Lato"/>
-                <a:sym typeface="Lato"/>
-              </a:rPr>
-              <a:t>Who are top performing salespeople / What are our top performing ads?</a:t>
-            </a:r>
-            <a:endParaRPr sz="1700">
-              <a:solidFill>
-                <a:schemeClr val="accent1"/>
-              </a:solidFill>
-              <a:latin typeface="Lato"/>
-              <a:ea typeface="Lato"/>
-              <a:cs typeface="Lato"/>
-              <a:sym typeface="Lato"/>
-            </a:endParaRPr>
-          </a:p>
-          <a:p>
-            <a:pPr marL="342900" lvl="0" indent="-344100" algn="l" rtl="0">
-              <a:lnSpc>
-                <a:spcPct val="115000"/>
-              </a:lnSpc>
-              <a:spcBef>
-                <a:spcPts val="1000"/>
-              </a:spcBef>
-              <a:spcAft>
-                <a:spcPts val="0"/>
-              </a:spcAft>
-              <a:buClr>
-                <a:schemeClr val="accent1"/>
-              </a:buClr>
-              <a:buSzPts val="2000"/>
-              <a:buFont typeface="Lato"/>
-              <a:buChar char="●"/>
-            </a:pPr>
-            <a:r>
-              <a:rPr lang="en-US" sz="2000" b="1">
-                <a:solidFill>
-                  <a:schemeClr val="accent1"/>
-                </a:solidFill>
-                <a:latin typeface="Lato"/>
-                <a:ea typeface="Lato"/>
-                <a:cs typeface="Lato"/>
-                <a:sym typeface="Lato"/>
-              </a:rPr>
-              <a:t>Operations</a:t>
-            </a:r>
-            <a:endParaRPr sz="2000" b="1">
-              <a:solidFill>
-                <a:schemeClr val="accent1"/>
-              </a:solidFill>
-              <a:latin typeface="Lato"/>
-              <a:ea typeface="Lato"/>
-              <a:cs typeface="Lato"/>
-              <a:sym typeface="Lato"/>
-            </a:endParaRPr>
-          </a:p>
-          <a:p>
-            <a:pPr marL="719999" lvl="1" indent="-269999" algn="l" rtl="0">
-              <a:lnSpc>
-                <a:spcPct val="115000"/>
-              </a:lnSpc>
-              <a:spcBef>
-                <a:spcPts val="1000"/>
-              </a:spcBef>
-              <a:spcAft>
-                <a:spcPts val="0"/>
-              </a:spcAft>
-              <a:buClr>
-                <a:schemeClr val="accent1"/>
-              </a:buClr>
-              <a:buSzPts val="1400"/>
-              <a:buFont typeface="Lato"/>
-              <a:buChar char="○"/>
-            </a:pPr>
-            <a:r>
-              <a:rPr lang="en-US" sz="2000">
-                <a:solidFill>
-                  <a:schemeClr val="accent1"/>
-                </a:solidFill>
-                <a:latin typeface="Lato"/>
-                <a:ea typeface="Lato"/>
-                <a:cs typeface="Lato"/>
-                <a:sym typeface="Lato"/>
-              </a:rPr>
-              <a:t>What does it cost to make our product?</a:t>
-            </a:r>
-            <a:endParaRPr sz="1500">
-              <a:solidFill>
-                <a:schemeClr val="accent1"/>
-              </a:solidFill>
-              <a:latin typeface="Lato"/>
-              <a:ea typeface="Lato"/>
-              <a:cs typeface="Lato"/>
-              <a:sym typeface="Lato"/>
-            </a:endParaRPr>
-          </a:p>
-          <a:p>
-            <a:pPr marL="719999" lvl="1" indent="-269999" algn="l" rtl="0">
-              <a:lnSpc>
-                <a:spcPct val="115000"/>
-              </a:lnSpc>
-              <a:spcBef>
-                <a:spcPts val="1000"/>
-              </a:spcBef>
-              <a:spcAft>
-                <a:spcPts val="0"/>
-              </a:spcAft>
-              <a:buClr>
-                <a:schemeClr val="accent1"/>
-              </a:buClr>
-              <a:buSzPts val="1400"/>
-              <a:buFont typeface="Lato"/>
-              <a:buChar char="○"/>
-            </a:pPr>
-            <a:r>
-              <a:rPr lang="en-US" sz="2000">
-                <a:solidFill>
-                  <a:schemeClr val="accent1"/>
-                </a:solidFill>
-                <a:latin typeface="Lato"/>
-                <a:ea typeface="Lato"/>
-                <a:cs typeface="Lato"/>
-                <a:sym typeface="Lato"/>
-              </a:rPr>
-              <a:t>What products are encountering zero-inventory?</a:t>
-            </a:r>
-            <a:endParaRPr sz="1700">
-              <a:solidFill>
-                <a:schemeClr val="accent1"/>
-              </a:solidFill>
-              <a:latin typeface="Lato"/>
-              <a:ea typeface="Lato"/>
-              <a:cs typeface="Lato"/>
-              <a:sym typeface="Lato"/>
-            </a:endParaRPr>
-          </a:p>
-          <a:p>
-            <a:pPr marL="342900" lvl="0" indent="-344100" algn="l" rtl="0">
-              <a:lnSpc>
-                <a:spcPct val="115000"/>
-              </a:lnSpc>
-              <a:spcBef>
-                <a:spcPts val="1000"/>
-              </a:spcBef>
-              <a:spcAft>
-                <a:spcPts val="0"/>
-              </a:spcAft>
-              <a:buClr>
-                <a:schemeClr val="accent1"/>
-              </a:buClr>
-              <a:buSzPts val="2000"/>
-              <a:buFont typeface="Lato"/>
-              <a:buChar char="●"/>
-            </a:pPr>
-            <a:r>
-              <a:rPr lang="en-US" sz="2000" b="1">
-                <a:solidFill>
-                  <a:schemeClr val="accent1"/>
-                </a:solidFill>
-                <a:latin typeface="Lato"/>
-                <a:ea typeface="Lato"/>
-                <a:cs typeface="Lato"/>
-                <a:sym typeface="Lato"/>
-              </a:rPr>
-              <a:t>Financial Risk</a:t>
-            </a:r>
-            <a:endParaRPr sz="2000" b="1">
-              <a:solidFill>
-                <a:schemeClr val="accent1"/>
-              </a:solidFill>
-              <a:latin typeface="Lato"/>
-              <a:ea typeface="Lato"/>
-              <a:cs typeface="Lato"/>
-              <a:sym typeface="Lato"/>
-            </a:endParaRPr>
-          </a:p>
-          <a:p>
-            <a:pPr marL="719999" lvl="1" indent="-269999" algn="l" rtl="0">
-              <a:lnSpc>
-                <a:spcPct val="115000"/>
-              </a:lnSpc>
-              <a:spcBef>
-                <a:spcPts val="1000"/>
-              </a:spcBef>
-              <a:spcAft>
-                <a:spcPts val="0"/>
-              </a:spcAft>
-              <a:buClr>
-                <a:schemeClr val="accent1"/>
-              </a:buClr>
-              <a:buSzPts val="1400"/>
-              <a:buFont typeface="Lato"/>
-              <a:buChar char="○"/>
-            </a:pPr>
-            <a:r>
-              <a:rPr lang="en-US" sz="2000">
-                <a:solidFill>
-                  <a:schemeClr val="accent1"/>
-                </a:solidFill>
-                <a:latin typeface="Lato"/>
-                <a:ea typeface="Lato"/>
-                <a:cs typeface="Lato"/>
-                <a:sym typeface="Lato"/>
-              </a:rPr>
-              <a:t>Which customers are at risk of defaulting?</a:t>
-            </a:r>
-            <a:endParaRPr sz="1500">
-              <a:solidFill>
-                <a:schemeClr val="accent1"/>
-              </a:solidFill>
-              <a:latin typeface="Lato"/>
-              <a:ea typeface="Lato"/>
-              <a:cs typeface="Lato"/>
-              <a:sym typeface="Lato"/>
-            </a:endParaRPr>
-          </a:p>
-          <a:p>
-            <a:pPr marL="719999" lvl="1" indent="-269999" algn="l" rtl="0">
-              <a:lnSpc>
-                <a:spcPct val="115000"/>
-              </a:lnSpc>
-              <a:spcBef>
-                <a:spcPts val="1000"/>
-              </a:spcBef>
-              <a:spcAft>
-                <a:spcPts val="0"/>
-              </a:spcAft>
-              <a:buClr>
-                <a:schemeClr val="accent1"/>
-              </a:buClr>
-              <a:buSzPts val="1400"/>
-              <a:buFont typeface="Lato"/>
-              <a:buChar char="○"/>
-            </a:pPr>
-            <a:r>
-              <a:rPr lang="en-US" sz="2000">
-                <a:solidFill>
-                  <a:schemeClr val="accent1"/>
-                </a:solidFill>
-                <a:latin typeface="Lato"/>
-                <a:ea typeface="Lato"/>
-                <a:cs typeface="Lato"/>
-                <a:sym typeface="Lato"/>
-              </a:rPr>
-              <a:t>What is our exposure to catastrophic events?</a:t>
-            </a:r>
-            <a:endParaRPr/>
-          </a:p>
-        </p:txBody>
-      </p:sp>
-    </p:spTree>
-  </p:cSld>
-  <p:clrMapOvr>
-    <a:masterClrMapping/>
-  </p:clrMapOvr>
-</p:sld>
-</file>
-
-<file path=ppt/slides/slide6.xml><?xml version="1.0" encoding="utf-8"?>
+<file path=ppt/slides/slide7.xml><?xml version="1.0" encoding="utf-8"?>
 <p:sld xmlns:a="http://schemas.openxmlformats.org/drawingml/2006/main" xmlns:r="http://schemas.openxmlformats.org/officeDocument/2006/relationships" xmlns:p="http://schemas.openxmlformats.org/presentationml/2006/main">
   <p:cSld>
     <p:spTree>
@@ -22342,30 +23217,41 @@
       </p:sp>
       <p:graphicFrame>
         <p:nvGraphicFramePr>
-          <p:cNvPr id="210" name="Google Shape;210;p32"/>
+          <p:cNvPr id="4" name="Google Shape;220;p33">
+            <a:extLst>
+              <a:ext uri="{FF2B5EF4-FFF2-40B4-BE49-F238E27FC236}">
+                <a16:creationId xmlns:a16="http://schemas.microsoft.com/office/drawing/2014/main" id="{AD3F470C-FD5D-4AD3-9B5A-F2EA7F86CBD1}"/>
+              </a:ext>
+            </a:extLst>
+          </p:cNvPr>
           <p:cNvGraphicFramePr/>
-          <p:nvPr/>
+          <p:nvPr>
+            <p:extLst>
+              <p:ext uri="{D42A27DB-BD31-4B8C-83A1-F6EECF244321}">
+                <p14:modId xmlns:p14="http://schemas.microsoft.com/office/powerpoint/2010/main" val="2124369209"/>
+              </p:ext>
+            </p:extLst>
+          </p:nvPr>
         </p:nvGraphicFramePr>
         <p:xfrm>
-          <a:off x="1127550" y="1981250"/>
-          <a:ext cx="10353150" cy="4330750"/>
+          <a:off x="771097" y="1725959"/>
+          <a:ext cx="10496598" cy="4419670"/>
         </p:xfrm>
         <a:graphic>
           <a:graphicData uri="http://schemas.openxmlformats.org/drawingml/2006/table">
             <a:tbl>
               <a:tblPr firstRow="1" bandRow="1">
                 <a:noFill/>
-                <a:tableStyleId>{8E96DC7D-18D6-495D-9E84-0E4E376F7C61}</a:tableStyleId>
               </a:tblPr>
               <a:tblGrid>
-                <a:gridCol w="3375750">
+                <a:gridCol w="1890622">
                   <a:extLst>
                     <a:ext uri="{9D8B030D-6E8A-4147-A177-3AD203B41FA5}">
                       <a16:colId xmlns:a16="http://schemas.microsoft.com/office/drawing/2014/main" val="20000"/>
                     </a:ext>
                   </a:extLst>
                 </a:gridCol>
-                <a:gridCol w="6977400">
+                <a:gridCol w="8605976">
                   <a:extLst>
                     <a:ext uri="{9D8B030D-6E8A-4147-A177-3AD203B41FA5}">
                       <a16:colId xmlns:a16="http://schemas.microsoft.com/office/drawing/2014/main" val="20001"/>
@@ -22373,7 +23259,7 @@
                   </a:extLst>
                 </a:gridCol>
               </a:tblGrid>
-              <a:tr h="380425">
+              <a:tr h="244850">
                 <a:tc>
                   <a:txBody>
                     <a:bodyPr/>
@@ -22388,10 +23274,29 @@
                         </a:spcAft>
                         <a:buNone/>
                       </a:pPr>
-                      <a:endParaRPr sz="1800"/>
+                      <a:r>
+                        <a:rPr lang="en-US" sz="2000" dirty="0">
+                          <a:solidFill>
+                            <a:schemeClr val="bg2"/>
+                          </a:solidFill>
+                        </a:rPr>
+                        <a:t>Objective</a:t>
+                      </a:r>
+                      <a:endParaRPr sz="2000" dirty="0">
+                        <a:solidFill>
+                          <a:schemeClr val="bg2"/>
+                        </a:solidFill>
+                      </a:endParaRPr>
                     </a:p>
                   </a:txBody>
-                  <a:tcPr marL="91450" marR="91450" marT="45725" marB="45725"/>
+                  <a:tcPr marL="91450" marR="91450" marT="45725" marB="45725">
+                    <a:solidFill>
+                      <a:schemeClr val="accent5">
+                        <a:lumMod val="20000"/>
+                        <a:lumOff val="80000"/>
+                      </a:schemeClr>
+                    </a:solidFill>
+                  </a:tcPr>
                 </a:tc>
                 <a:tc>
                   <a:txBody>
@@ -22408,13 +23313,28 @@
                         <a:buNone/>
                       </a:pPr>
                       <a:r>
-                        <a:rPr lang="en-US" sz="1800"/>
-                        <a:t>Sufficient</a:t>
+                        <a:rPr lang="en-US" sz="2000" dirty="0">
+                          <a:solidFill>
+                            <a:schemeClr val="bg2"/>
+                          </a:solidFill>
+                        </a:rPr>
+                        <a:t>Criteria</a:t>
                       </a:r>
-                      <a:endParaRPr/>
+                      <a:endParaRPr sz="2000" dirty="0">
+                        <a:solidFill>
+                          <a:schemeClr val="bg2"/>
+                        </a:solidFill>
+                      </a:endParaRPr>
                     </a:p>
                   </a:txBody>
-                  <a:tcPr marL="91450" marR="91450" marT="45725" marB="45725"/>
+                  <a:tcPr marL="91450" marR="91450" marT="45725" marB="45725">
+                    <a:solidFill>
+                      <a:schemeClr val="accent5">
+                        <a:lumMod val="20000"/>
+                        <a:lumOff val="80000"/>
+                      </a:schemeClr>
+                    </a:solidFill>
+                  </a:tcPr>
                 </a:tc>
                 <a:extLst>
                   <a:ext uri="{0D108BD9-81ED-4DB2-BD59-A6C34878D82A}">
@@ -22422,7 +23342,7 @@
                   </a:ext>
                 </a:extLst>
               </a:tr>
-              <a:tr h="951400">
+              <a:tr h="244850">
                 <a:tc>
                   <a:txBody>
                     <a:bodyPr/>
@@ -22438,16 +23358,16 @@
                         <a:buNone/>
                       </a:pPr>
                       <a:r>
-                        <a:rPr lang="en-US" sz="1800">
+                        <a:rPr lang="en-US" sz="1800" b="1">
                           <a:solidFill>
-                            <a:srgbClr val="000000"/>
+                            <a:schemeClr val="tx1"/>
                           </a:solidFill>
                         </a:rPr>
                         <a:t>Documentation</a:t>
                       </a:r>
-                      <a:endParaRPr>
+                      <a:endParaRPr b="1">
                         <a:solidFill>
-                          <a:srgbClr val="000000"/>
+                          <a:schemeClr val="tx1"/>
                         </a:solidFill>
                       </a:endParaRPr>
                     </a:p>
@@ -22469,66 +23389,13 @@
                         <a:buNone/>
                       </a:pPr>
                       <a:r>
-                        <a:rPr lang="en-US" sz="1800">
+                        <a:rPr lang="en-US" sz="2000" dirty="0">
                           <a:solidFill>
-                            <a:srgbClr val="000000"/>
+                            <a:schemeClr val="tx1"/>
                           </a:solidFill>
                         </a:rPr>
-                        <a:t>Comments clarify complex code. </a:t>
+                        <a:t>Comments clarify complex code,  Entity names (Tables, Fields, etc.) are intuitive, Code is easy to read.</a:t>
                       </a:r>
-                      <a:endParaRPr>
-                        <a:solidFill>
-                          <a:srgbClr val="000000"/>
-                        </a:solidFill>
-                      </a:endParaRPr>
-                    </a:p>
-                    <a:p>
-                      <a:pPr marL="0" marR="0" lvl="0" indent="0" algn="l" rtl="0">
-                        <a:spcBef>
-                          <a:spcPts val="0"/>
-                        </a:spcBef>
-                        <a:spcAft>
-                          <a:spcPts val="0"/>
-                        </a:spcAft>
-                        <a:buNone/>
-                      </a:pPr>
-                      <a:r>
-                        <a:rPr lang="en-US" sz="1800">
-                          <a:solidFill>
-                            <a:srgbClr val="000000"/>
-                          </a:solidFill>
-                        </a:rPr>
-                        <a:t>Object names are intuitive.</a:t>
-                      </a:r>
-                      <a:endParaRPr>
-                        <a:solidFill>
-                          <a:srgbClr val="000000"/>
-                        </a:solidFill>
-                      </a:endParaRPr>
-                    </a:p>
-                    <a:p>
-                      <a:pPr marL="0" marR="0" lvl="0" indent="0" algn="l" rtl="0">
-                        <a:spcBef>
-                          <a:spcPts val="0"/>
-                        </a:spcBef>
-                        <a:spcAft>
-                          <a:spcPts val="0"/>
-                        </a:spcAft>
-                        <a:buNone/>
-                      </a:pPr>
-                      <a:r>
-                        <a:rPr lang="en-US" sz="1800">
-                          <a:solidFill>
-                            <a:srgbClr val="000000"/>
-                          </a:solidFill>
-                        </a:rPr>
-                        <a:t>Code is easy to read.</a:t>
-                      </a:r>
-                      <a:endParaRPr>
-                        <a:solidFill>
-                          <a:srgbClr val="000000"/>
-                        </a:solidFill>
-                      </a:endParaRPr>
                     </a:p>
                   </a:txBody>
                   <a:tcPr marL="91450" marR="91450" marT="45725" marB="45725"/>
@@ -22539,7 +23406,7 @@
                   </a:ext>
                 </a:extLst>
               </a:tr>
-              <a:tr h="683575">
+              <a:tr h="244850">
                 <a:tc>
                   <a:txBody>
                     <a:bodyPr/>
@@ -22555,16 +23422,16 @@
                         <a:buNone/>
                       </a:pPr>
                       <a:r>
-                        <a:rPr lang="en-US" sz="1800">
+                        <a:rPr lang="en-US" sz="1800" b="1">
                           <a:solidFill>
-                            <a:srgbClr val="000000"/>
+                            <a:schemeClr val="tx1"/>
                           </a:solidFill>
                         </a:rPr>
                         <a:t>Problem Formulation</a:t>
                       </a:r>
-                      <a:endParaRPr>
+                      <a:endParaRPr b="1">
                         <a:solidFill>
-                          <a:srgbClr val="000000"/>
+                          <a:schemeClr val="tx1"/>
                         </a:solidFill>
                       </a:endParaRPr>
                     </a:p>
@@ -22586,18 +23453,13 @@
                         <a:buNone/>
                       </a:pPr>
                       <a:r>
-                        <a:rPr lang="en-US" sz="1800">
+                        <a:rPr lang="en-US" sz="2000" dirty="0">
                           <a:solidFill>
-                            <a:srgbClr val="000000"/>
+                            <a:schemeClr val="tx1"/>
                           </a:solidFill>
                         </a:rPr>
                         <a:t>Questions are relevant and answerable by the available data.</a:t>
                       </a:r>
-                      <a:endParaRPr>
-                        <a:solidFill>
-                          <a:srgbClr val="000000"/>
-                        </a:solidFill>
-                      </a:endParaRPr>
                     </a:p>
                     <a:p>
                       <a:pPr marL="0" marR="0" lvl="0" indent="0" algn="l" rtl="0">
@@ -22610,18 +23472,13 @@
                         <a:buNone/>
                       </a:pPr>
                       <a:r>
-                        <a:rPr lang="en-US" sz="1800">
+                        <a:rPr lang="en-US" sz="2000" dirty="0">
                           <a:solidFill>
-                            <a:srgbClr val="000000"/>
+                            <a:schemeClr val="tx1"/>
                           </a:solidFill>
                         </a:rPr>
                         <a:t>Answers enable a decision by an interested party.</a:t>
                       </a:r>
-                      <a:endParaRPr>
-                        <a:solidFill>
-                          <a:srgbClr val="000000"/>
-                        </a:solidFill>
-                      </a:endParaRPr>
                     </a:p>
                   </a:txBody>
                   <a:tcPr marL="91450" marR="91450" marT="45725" marB="45725"/>
@@ -22632,7 +23489,7 @@
                   </a:ext>
                 </a:extLst>
               </a:tr>
-              <a:tr h="380425">
+              <a:tr h="244850">
                 <a:tc>
                   <a:txBody>
                     <a:bodyPr/>
@@ -22648,16 +23505,16 @@
                         <a:buNone/>
                       </a:pPr>
                       <a:r>
-                        <a:rPr lang="en-US" sz="1800">
+                        <a:rPr lang="en-US" sz="1800" b="1" dirty="0">
                           <a:solidFill>
-                            <a:srgbClr val="000000"/>
+                            <a:schemeClr val="tx1"/>
                           </a:solidFill>
                         </a:rPr>
-                        <a:t>Database Design*</a:t>
+                        <a:t>Database Design</a:t>
                       </a:r>
-                      <a:endParaRPr>
+                      <a:endParaRPr b="1" dirty="0">
                         <a:solidFill>
-                          <a:srgbClr val="000000"/>
+                          <a:schemeClr val="tx1"/>
                         </a:solidFill>
                       </a:endParaRPr>
                     </a:p>
@@ -22679,18 +23536,13 @@
                         <a:buNone/>
                       </a:pPr>
                       <a:r>
-                        <a:rPr lang="en-US" sz="1800">
+                        <a:rPr lang="en-US" sz="2000" dirty="0">
                           <a:solidFill>
-                            <a:srgbClr val="000000"/>
+                            <a:schemeClr val="tx1"/>
                           </a:solidFill>
                         </a:rPr>
                         <a:t>All tables adhere to 1NF.</a:t>
                       </a:r>
-                      <a:endParaRPr>
-                        <a:solidFill>
-                          <a:srgbClr val="000000"/>
-                        </a:solidFill>
-                      </a:endParaRPr>
                     </a:p>
                     <a:p>
                       <a:pPr marL="0" marR="0" lvl="0" indent="0" algn="l" rtl="0">
@@ -22703,42 +23555,13 @@
                         <a:buNone/>
                       </a:pPr>
                       <a:r>
-                        <a:rPr lang="en-US" sz="1800">
+                        <a:rPr lang="en-US" sz="2000" dirty="0">
                           <a:solidFill>
-                            <a:srgbClr val="000000"/>
+                            <a:schemeClr val="tx1"/>
                           </a:solidFill>
                         </a:rPr>
-                        <a:t>All tables are connected to at least one table.</a:t>
+                        <a:t>Entity-Relationship Diagram (ERD) adheres to an appropriate schema.</a:t>
                       </a:r>
-                      <a:endParaRPr>
-                        <a:solidFill>
-                          <a:srgbClr val="000000"/>
-                        </a:solidFill>
-                      </a:endParaRPr>
-                    </a:p>
-                    <a:p>
-                      <a:pPr marL="0" marR="0" lvl="0" indent="0" algn="l" rtl="0">
-                        <a:spcBef>
-                          <a:spcPts val="0"/>
-                        </a:spcBef>
-                        <a:spcAft>
-                          <a:spcPts val="0"/>
-                        </a:spcAft>
-                        <a:buNone/>
-                      </a:pPr>
-                      <a:r>
-                        <a:rPr lang="en-US" sz="1800">
-                          <a:solidFill>
-                            <a:srgbClr val="000000"/>
-                          </a:solidFill>
-                        </a:rPr>
-                        <a:t>Database schema adheres to an appropriate schema.</a:t>
-                      </a:r>
-                      <a:endParaRPr>
-                        <a:solidFill>
-                          <a:srgbClr val="000000"/>
-                        </a:solidFill>
-                      </a:endParaRPr>
                     </a:p>
                   </a:txBody>
                   <a:tcPr marL="91450" marR="91450" marT="45725" marB="45725"/>
@@ -22749,7 +23572,7 @@
                   </a:ext>
                 </a:extLst>
               </a:tr>
-              <a:tr h="380425">
+              <a:tr h="244850">
                 <a:tc>
                   <a:txBody>
                     <a:bodyPr/>
@@ -22765,16 +23588,16 @@
                         <a:buNone/>
                       </a:pPr>
                       <a:r>
-                        <a:rPr lang="en-US" sz="1800">
+                        <a:rPr lang="en-US" sz="1800" b="1" dirty="0">
                           <a:solidFill>
-                            <a:srgbClr val="000000"/>
+                            <a:schemeClr val="tx1"/>
                           </a:solidFill>
                         </a:rPr>
                         <a:t>Data Cleanliness</a:t>
                       </a:r>
-                      <a:endParaRPr>
+                      <a:endParaRPr b="1" dirty="0">
                         <a:solidFill>
-                          <a:srgbClr val="000000"/>
+                          <a:schemeClr val="tx1"/>
                         </a:solidFill>
                       </a:endParaRPr>
                     </a:p>
@@ -22796,53 +23619,24 @@
                         <a:buNone/>
                       </a:pPr>
                       <a:r>
-                        <a:rPr lang="en-US" sz="1800">
+                        <a:rPr lang="en-US" sz="2000" dirty="0">
                           <a:solidFill>
-                            <a:srgbClr val="000000"/>
+                            <a:schemeClr val="tx1"/>
                           </a:solidFill>
                         </a:rPr>
-                        <a:t>Data adhere to appropriate data types.</a:t>
+                        <a:t>Data adhere to appropriate data types, Data is clean.</a:t>
                       </a:r>
-                      <a:endParaRPr>
-                        <a:solidFill>
-                          <a:srgbClr val="000000"/>
-                        </a:solidFill>
-                      </a:endParaRPr>
-                    </a:p>
-                    <a:p>
-                      <a:pPr marL="0" marR="0" lvl="0" indent="0" algn="l" rtl="0">
-                        <a:spcBef>
-                          <a:spcPts val="0"/>
-                        </a:spcBef>
-                        <a:spcAft>
-                          <a:spcPts val="0"/>
-                        </a:spcAft>
-                        <a:buNone/>
-                      </a:pPr>
-                      <a:r>
-                        <a:rPr lang="en-US" sz="1800">
-                          <a:solidFill>
-                            <a:srgbClr val="000000"/>
-                          </a:solidFill>
-                        </a:rPr>
-                        <a:t>Data is clean.</a:t>
-                      </a:r>
-                      <a:endParaRPr>
-                        <a:solidFill>
-                          <a:srgbClr val="000000"/>
-                        </a:solidFill>
-                      </a:endParaRPr>
                     </a:p>
                   </a:txBody>
                   <a:tcPr marL="91450" marR="91450" marT="45725" marB="45725"/>
                 </a:tc>
                 <a:extLst>
                   <a:ext uri="{0D108BD9-81ED-4DB2-BD59-A6C34878D82A}">
-                    <a16:rowId xmlns:a16="http://schemas.microsoft.com/office/drawing/2014/main" val="10004"/>
+                    <a16:rowId xmlns:a16="http://schemas.microsoft.com/office/drawing/2014/main" val="4250947870"/>
                   </a:ext>
                 </a:extLst>
               </a:tr>
-              <a:tr h="380425">
+              <a:tr h="244850">
                 <a:tc>
                   <a:txBody>
                     <a:bodyPr/>
@@ -22858,16 +23652,16 @@
                         <a:buNone/>
                       </a:pPr>
                       <a:r>
-                        <a:rPr lang="en-US" sz="1800">
+                        <a:rPr lang="en-US" sz="1800" b="1">
                           <a:solidFill>
-                            <a:srgbClr val="000000"/>
+                            <a:schemeClr val="tx1"/>
                           </a:solidFill>
                         </a:rPr>
                         <a:t>Code Optimization</a:t>
                       </a:r>
-                      <a:endParaRPr>
+                      <a:endParaRPr b="1">
                         <a:solidFill>
-                          <a:srgbClr val="000000"/>
+                          <a:schemeClr val="tx1"/>
                         </a:solidFill>
                       </a:endParaRPr>
                     </a:p>
@@ -22889,29 +23683,24 @@
                         <a:buNone/>
                       </a:pPr>
                       <a:r>
-                        <a:rPr lang="en-US" sz="1800">
+                        <a:rPr lang="en-US" sz="2000" dirty="0">
                           <a:solidFill>
-                            <a:srgbClr val="000000"/>
+                            <a:schemeClr val="tx1"/>
                           </a:solidFill>
                         </a:rPr>
                         <a:t>SQL code optimized for storage or performance.</a:t>
                       </a:r>
-                      <a:endParaRPr>
-                        <a:solidFill>
-                          <a:srgbClr val="000000"/>
-                        </a:solidFill>
-                      </a:endParaRPr>
                     </a:p>
                   </a:txBody>
                   <a:tcPr marL="91450" marR="91450" marT="45725" marB="45725"/>
                 </a:tc>
                 <a:extLst>
                   <a:ext uri="{0D108BD9-81ED-4DB2-BD59-A6C34878D82A}">
-                    <a16:rowId xmlns:a16="http://schemas.microsoft.com/office/drawing/2014/main" val="10005"/>
+                    <a16:rowId xmlns:a16="http://schemas.microsoft.com/office/drawing/2014/main" val="1480642031"/>
                   </a:ext>
                 </a:extLst>
               </a:tr>
-              <a:tr h="380425">
+              <a:tr h="244850">
                 <a:tc>
                   <a:txBody>
                     <a:bodyPr/>
@@ -22927,16 +23716,16 @@
                         <a:buNone/>
                       </a:pPr>
                       <a:r>
-                        <a:rPr lang="en-US" sz="1800">
+                        <a:rPr lang="en-US" sz="1800" b="1" dirty="0">
                           <a:solidFill>
-                            <a:srgbClr val="000000"/>
+                            <a:schemeClr val="tx1"/>
                           </a:solidFill>
                         </a:rPr>
                         <a:t>Database Creation</a:t>
                       </a:r>
-                      <a:endParaRPr>
+                      <a:endParaRPr b="1" dirty="0">
                         <a:solidFill>
-                          <a:srgbClr val="000000"/>
+                          <a:schemeClr val="tx1"/>
                         </a:solidFill>
                       </a:endParaRPr>
                     </a:p>
@@ -22958,25 +23747,20 @@
                         <a:buNone/>
                       </a:pPr>
                       <a:r>
-                        <a:rPr lang="en-US" sz="1800">
+                        <a:rPr lang="en-US" sz="2000" dirty="0">
                           <a:solidFill>
-                            <a:srgbClr val="000000"/>
+                            <a:schemeClr val="tx1"/>
                           </a:solidFill>
                         </a:rPr>
                         <a:t>Tables have appropriate constraints.</a:t>
                       </a:r>
-                      <a:endParaRPr>
-                        <a:solidFill>
-                          <a:srgbClr val="000000"/>
-                        </a:solidFill>
-                      </a:endParaRPr>
                     </a:p>
                   </a:txBody>
                   <a:tcPr marL="91450" marR="91450" marT="45725" marB="45725"/>
                 </a:tc>
                 <a:extLst>
                   <a:ext uri="{0D108BD9-81ED-4DB2-BD59-A6C34878D82A}">
-                    <a16:rowId xmlns:a16="http://schemas.microsoft.com/office/drawing/2014/main" val="10006"/>
+                    <a16:rowId xmlns:a16="http://schemas.microsoft.com/office/drawing/2014/main" val="489137171"/>
                   </a:ext>
                 </a:extLst>
               </a:tr>
@@ -22984,781 +23768,6 @@
           </a:graphicData>
         </a:graphic>
       </p:graphicFrame>
-    </p:spTree>
-  </p:cSld>
-  <p:clrMapOvr>
-    <a:masterClrMapping/>
-  </p:clrMapOvr>
-</p:sld>
-</file>
-
-<file path=ppt/slides/slide7.xml><?xml version="1.0" encoding="utf-8"?>
-<p:sld xmlns:a="http://schemas.openxmlformats.org/drawingml/2006/main" xmlns:r="http://schemas.openxmlformats.org/officeDocument/2006/relationships" xmlns:p="http://schemas.openxmlformats.org/presentationml/2006/main">
-  <p:cSld>
-    <p:spTree>
-      <p:nvGrpSpPr>
-        <p:cNvPr id="1" name="Shape 214"/>
-        <p:cNvGrpSpPr/>
-        <p:nvPr/>
-      </p:nvGrpSpPr>
-      <p:grpSpPr>
-        <a:xfrm>
-          <a:off x="0" y="0"/>
-          <a:ext cx="0" cy="0"/>
-          <a:chOff x="0" y="0"/>
-          <a:chExt cx="0" cy="0"/>
-        </a:xfrm>
-      </p:grpSpPr>
-      <p:sp>
-        <p:nvSpPr>
-          <p:cNvPr id="215" name="Google Shape;215;p33"/>
-          <p:cNvSpPr txBox="1">
-            <a:spLocks noGrp="1"/>
-          </p:cNvSpPr>
-          <p:nvPr>
-            <p:ph type="ctrTitle"/>
-          </p:nvPr>
-        </p:nvSpPr>
-        <p:spPr>
-          <a:xfrm>
-            <a:off x="913795" y="609600"/>
-            <a:ext cx="10353900" cy="970500"/>
-          </a:xfrm>
-          <a:prstGeom prst="rect">
-            <a:avLst/>
-          </a:prstGeom>
-          <a:noFill/>
-          <a:ln>
-            <a:noFill/>
-          </a:ln>
-          <a:effectLst>
-            <a:outerShdw blurRad="25400">
-              <a:srgbClr val="000000">
-                <a:alpha val="45880"/>
-              </a:srgbClr>
-            </a:outerShdw>
-          </a:effectLst>
-        </p:spPr>
-        <p:txBody>
-          <a:bodyPr spcFirstLastPara="1" wrap="square" lIns="91425" tIns="45700" rIns="91425" bIns="45700" anchor="ctr" anchorCtr="0">
-            <a:noAutofit/>
-          </a:bodyPr>
-          <a:lstStyle/>
-          <a:p>
-            <a:pPr marL="0" lvl="0" indent="0" algn="l" rtl="0">
-              <a:spcBef>
-                <a:spcPts val="0"/>
-              </a:spcBef>
-              <a:spcAft>
-                <a:spcPts val="0"/>
-              </a:spcAft>
-              <a:buClr>
-                <a:schemeClr val="lt2"/>
-              </a:buClr>
-              <a:buSzPts val="4000"/>
-              <a:buFont typeface="Lustria"/>
-              <a:buNone/>
-            </a:pPr>
-            <a:r>
-              <a:rPr lang="en-US" sz="3600"/>
-              <a:t>Class Project - Problem Understanding &amp; Goal</a:t>
-            </a:r>
-            <a:endParaRPr sz="3600"/>
-          </a:p>
-        </p:txBody>
-      </p:sp>
-      <p:sp>
-        <p:nvSpPr>
-          <p:cNvPr id="216" name="Google Shape;216;p33"/>
-          <p:cNvSpPr txBox="1"/>
-          <p:nvPr/>
-        </p:nvSpPr>
-        <p:spPr>
-          <a:xfrm>
-            <a:off x="6224750" y="4556600"/>
-            <a:ext cx="5611200" cy="700800"/>
-          </a:xfrm>
-          <a:prstGeom prst="rect">
-            <a:avLst/>
-          </a:prstGeom>
-          <a:noFill/>
-          <a:ln>
-            <a:noFill/>
-          </a:ln>
-        </p:spPr>
-        <p:txBody>
-          <a:bodyPr spcFirstLastPara="1" wrap="square" lIns="91425" tIns="91425" rIns="91425" bIns="91425" anchor="t" anchorCtr="0">
-            <a:noAutofit/>
-          </a:bodyPr>
-          <a:lstStyle/>
-          <a:p>
-            <a:pPr marL="0" lvl="0" indent="0" algn="l" rtl="0">
-              <a:lnSpc>
-                <a:spcPct val="80000"/>
-              </a:lnSpc>
-              <a:spcBef>
-                <a:spcPts val="820"/>
-              </a:spcBef>
-              <a:spcAft>
-                <a:spcPts val="0"/>
-              </a:spcAft>
-              <a:buNone/>
-            </a:pPr>
-            <a:r>
-              <a:rPr lang="en-US" sz="1800" b="1" u="sng">
-                <a:solidFill>
-                  <a:schemeClr val="accent1"/>
-                </a:solidFill>
-                <a:latin typeface="Lato"/>
-                <a:ea typeface="Lato"/>
-                <a:cs typeface="Lato"/>
-                <a:sym typeface="Lato"/>
-              </a:rPr>
-              <a:t>Tonight’s Project Steps</a:t>
-            </a:r>
-            <a:r>
-              <a:rPr lang="en-US" sz="1800" b="1">
-                <a:solidFill>
-                  <a:schemeClr val="accent1"/>
-                </a:solidFill>
-                <a:latin typeface="Lato"/>
-                <a:ea typeface="Lato"/>
-                <a:cs typeface="Lato"/>
-                <a:sym typeface="Lato"/>
-              </a:rPr>
-              <a:t>:  </a:t>
-            </a:r>
-            <a:endParaRPr sz="1800" b="1">
-              <a:solidFill>
-                <a:schemeClr val="accent1"/>
-              </a:solidFill>
-              <a:latin typeface="Lato"/>
-              <a:ea typeface="Lato"/>
-              <a:cs typeface="Lato"/>
-              <a:sym typeface="Lato"/>
-            </a:endParaRPr>
-          </a:p>
-          <a:p>
-            <a:pPr marL="0" lvl="0" indent="0" algn="l" rtl="0">
-              <a:lnSpc>
-                <a:spcPct val="80000"/>
-              </a:lnSpc>
-              <a:spcBef>
-                <a:spcPts val="820"/>
-              </a:spcBef>
-              <a:spcAft>
-                <a:spcPts val="0"/>
-              </a:spcAft>
-              <a:buNone/>
-            </a:pPr>
-            <a:r>
-              <a:rPr lang="en-US" sz="1800" b="1">
-                <a:solidFill>
-                  <a:schemeClr val="accent1"/>
-                </a:solidFill>
-                <a:latin typeface="Lato"/>
-                <a:ea typeface="Lato"/>
-                <a:cs typeface="Lato"/>
-                <a:sym typeface="Lato"/>
-              </a:rPr>
-              <a:t>Step 1) Navigate to “Class Project\consoles” folder</a:t>
-            </a:r>
-            <a:endParaRPr sz="1800" b="1">
-              <a:solidFill>
-                <a:schemeClr val="accent1"/>
-              </a:solidFill>
-              <a:latin typeface="Lato"/>
-              <a:ea typeface="Lato"/>
-              <a:cs typeface="Lato"/>
-              <a:sym typeface="Lato"/>
-            </a:endParaRPr>
-          </a:p>
-          <a:p>
-            <a:pPr marL="0" lvl="0" indent="0" algn="l" rtl="0">
-              <a:lnSpc>
-                <a:spcPct val="80000"/>
-              </a:lnSpc>
-              <a:spcBef>
-                <a:spcPts val="820"/>
-              </a:spcBef>
-              <a:spcAft>
-                <a:spcPts val="0"/>
-              </a:spcAft>
-              <a:buNone/>
-            </a:pPr>
-            <a:endParaRPr sz="1800" b="1">
-              <a:solidFill>
-                <a:schemeClr val="accent1"/>
-              </a:solidFill>
-              <a:latin typeface="Lato"/>
-              <a:ea typeface="Lato"/>
-              <a:cs typeface="Lato"/>
-              <a:sym typeface="Lato"/>
-            </a:endParaRPr>
-          </a:p>
-          <a:p>
-            <a:pPr marL="0" lvl="0" indent="0" algn="l" rtl="0">
-              <a:lnSpc>
-                <a:spcPct val="80000"/>
-              </a:lnSpc>
-              <a:spcBef>
-                <a:spcPts val="820"/>
-              </a:spcBef>
-              <a:spcAft>
-                <a:spcPts val="0"/>
-              </a:spcAft>
-              <a:buNone/>
-            </a:pPr>
-            <a:r>
-              <a:rPr lang="en-US" sz="1800" b="1">
-                <a:solidFill>
-                  <a:schemeClr val="accent1"/>
-                </a:solidFill>
-                <a:latin typeface="Lato"/>
-                <a:ea typeface="Lato"/>
-                <a:cs typeface="Lato"/>
-                <a:sym typeface="Lato"/>
-              </a:rPr>
-              <a:t>Step 2) Open the “console_games_import.sql” file</a:t>
-            </a:r>
-            <a:endParaRPr sz="1800" b="1">
-              <a:solidFill>
-                <a:schemeClr val="accent1"/>
-              </a:solidFill>
-              <a:latin typeface="Lato"/>
-              <a:ea typeface="Lato"/>
-              <a:cs typeface="Lato"/>
-              <a:sym typeface="Lato"/>
-            </a:endParaRPr>
-          </a:p>
-          <a:p>
-            <a:pPr marL="0" lvl="0" indent="0" algn="l" rtl="0">
-              <a:lnSpc>
-                <a:spcPct val="80000"/>
-              </a:lnSpc>
-              <a:spcBef>
-                <a:spcPts val="820"/>
-              </a:spcBef>
-              <a:spcAft>
-                <a:spcPts val="0"/>
-              </a:spcAft>
-              <a:buNone/>
-            </a:pPr>
-            <a:endParaRPr sz="1800" b="1">
-              <a:solidFill>
-                <a:schemeClr val="accent1"/>
-              </a:solidFill>
-              <a:latin typeface="Lato"/>
-              <a:ea typeface="Lato"/>
-              <a:cs typeface="Lato"/>
-              <a:sym typeface="Lato"/>
-            </a:endParaRPr>
-          </a:p>
-          <a:p>
-            <a:pPr marL="0" lvl="0" indent="0" algn="l" rtl="0">
-              <a:lnSpc>
-                <a:spcPct val="80000"/>
-              </a:lnSpc>
-              <a:spcBef>
-                <a:spcPts val="820"/>
-              </a:spcBef>
-              <a:spcAft>
-                <a:spcPts val="0"/>
-              </a:spcAft>
-              <a:buNone/>
-            </a:pPr>
-            <a:r>
-              <a:rPr lang="en-US" sz="1800" b="1">
-                <a:solidFill>
-                  <a:schemeClr val="accent1"/>
-                </a:solidFill>
-                <a:latin typeface="Lato"/>
-                <a:ea typeface="Lato"/>
-                <a:cs typeface="Lato"/>
-                <a:sym typeface="Lato"/>
-              </a:rPr>
-              <a:t>Step 3) Read and execute directions in file</a:t>
-            </a:r>
-            <a:endParaRPr sz="1800" b="1">
-              <a:solidFill>
-                <a:schemeClr val="accent1"/>
-              </a:solidFill>
-              <a:latin typeface="Lato"/>
-              <a:ea typeface="Lato"/>
-              <a:cs typeface="Lato"/>
-              <a:sym typeface="Lato"/>
-            </a:endParaRPr>
-          </a:p>
-          <a:p>
-            <a:pPr marL="0" lvl="0" indent="0" algn="l" rtl="0">
-              <a:lnSpc>
-                <a:spcPct val="80000"/>
-              </a:lnSpc>
-              <a:spcBef>
-                <a:spcPts val="820"/>
-              </a:spcBef>
-              <a:spcAft>
-                <a:spcPts val="0"/>
-              </a:spcAft>
-              <a:buNone/>
-            </a:pPr>
-            <a:endParaRPr sz="1800" b="1">
-              <a:solidFill>
-                <a:schemeClr val="accent1"/>
-              </a:solidFill>
-              <a:latin typeface="Lato"/>
-              <a:ea typeface="Lato"/>
-              <a:cs typeface="Lato"/>
-              <a:sym typeface="Lato"/>
-            </a:endParaRPr>
-          </a:p>
-          <a:p>
-            <a:pPr marL="0" marR="0" lvl="0" indent="0" algn="l" rtl="0">
-              <a:lnSpc>
-                <a:spcPct val="80000"/>
-              </a:lnSpc>
-              <a:spcBef>
-                <a:spcPts val="820"/>
-              </a:spcBef>
-              <a:spcAft>
-                <a:spcPts val="0"/>
-              </a:spcAft>
-              <a:buNone/>
-            </a:pPr>
-            <a:endParaRPr/>
-          </a:p>
-        </p:txBody>
-      </p:sp>
-      <p:sp>
-        <p:nvSpPr>
-          <p:cNvPr id="217" name="Google Shape;217;p33"/>
-          <p:cNvSpPr txBox="1"/>
-          <p:nvPr/>
-        </p:nvSpPr>
-        <p:spPr>
-          <a:xfrm>
-            <a:off x="1019150" y="1677750"/>
-            <a:ext cx="10353900" cy="700800"/>
-          </a:xfrm>
-          <a:prstGeom prst="rect">
-            <a:avLst/>
-          </a:prstGeom>
-          <a:noFill/>
-          <a:ln>
-            <a:noFill/>
-          </a:ln>
-        </p:spPr>
-        <p:txBody>
-          <a:bodyPr spcFirstLastPara="1" wrap="square" lIns="91425" tIns="91425" rIns="91425" bIns="91425" anchor="t" anchorCtr="0">
-            <a:noAutofit/>
-          </a:bodyPr>
-          <a:lstStyle/>
-          <a:p>
-            <a:pPr marL="0" lvl="0" indent="0" algn="l" rtl="0">
-              <a:lnSpc>
-                <a:spcPct val="80000"/>
-              </a:lnSpc>
-              <a:spcBef>
-                <a:spcPts val="820"/>
-              </a:spcBef>
-              <a:spcAft>
-                <a:spcPts val="0"/>
-              </a:spcAft>
-              <a:buNone/>
-            </a:pPr>
-            <a:r>
-              <a:rPr lang="en-US" sz="1800" b="1" u="sng">
-                <a:solidFill>
-                  <a:schemeClr val="accent1"/>
-                </a:solidFill>
-                <a:latin typeface="Lato"/>
-                <a:ea typeface="Lato"/>
-                <a:cs typeface="Lato"/>
-                <a:sym typeface="Lato"/>
-              </a:rPr>
-              <a:t>Problem Statement</a:t>
-            </a:r>
-            <a:r>
-              <a:rPr lang="en-US" sz="1800" b="1">
-                <a:solidFill>
-                  <a:schemeClr val="accent1"/>
-                </a:solidFill>
-                <a:latin typeface="Lato"/>
-                <a:ea typeface="Lato"/>
-                <a:cs typeface="Lato"/>
-                <a:sym typeface="Lato"/>
-              </a:rPr>
-              <a:t>  </a:t>
-            </a:r>
-            <a:endParaRPr sz="1800" b="1">
-              <a:solidFill>
-                <a:schemeClr val="accent1"/>
-              </a:solidFill>
-              <a:latin typeface="Lato"/>
-              <a:ea typeface="Lato"/>
-              <a:cs typeface="Lato"/>
-              <a:sym typeface="Lato"/>
-            </a:endParaRPr>
-          </a:p>
-          <a:p>
-            <a:pPr marL="0" lvl="0" indent="0" algn="l" rtl="0">
-              <a:lnSpc>
-                <a:spcPct val="80000"/>
-              </a:lnSpc>
-              <a:spcBef>
-                <a:spcPts val="820"/>
-              </a:spcBef>
-              <a:spcAft>
-                <a:spcPts val="0"/>
-              </a:spcAft>
-              <a:buNone/>
-            </a:pPr>
-            <a:r>
-              <a:rPr lang="en-US" sz="1800" b="1">
-                <a:solidFill>
-                  <a:schemeClr val="accent1"/>
-                </a:solidFill>
-                <a:latin typeface="Lato"/>
-                <a:ea typeface="Lato"/>
-                <a:cs typeface="Lato"/>
-                <a:sym typeface="Lato"/>
-              </a:rPr>
-              <a:t>The senior leadership team at “NameCo, Inc” would like to create a new smash-hit video game, intended for the hand-held console market.   After much brainstorming, the CEO declares that “People love drama, so let’s create a new “Barbie Adventure Game”!” </a:t>
-            </a:r>
-            <a:endParaRPr sz="1800" b="1">
-              <a:solidFill>
-                <a:schemeClr val="accent1"/>
-              </a:solidFill>
-              <a:latin typeface="Lato"/>
-              <a:ea typeface="Lato"/>
-              <a:cs typeface="Lato"/>
-              <a:sym typeface="Lato"/>
-            </a:endParaRPr>
-          </a:p>
-          <a:p>
-            <a:pPr marL="0" lvl="0" indent="0" algn="l" rtl="0">
-              <a:lnSpc>
-                <a:spcPct val="80000"/>
-              </a:lnSpc>
-              <a:spcBef>
-                <a:spcPts val="820"/>
-              </a:spcBef>
-              <a:spcAft>
-                <a:spcPts val="0"/>
-              </a:spcAft>
-              <a:buNone/>
-            </a:pPr>
-            <a:endParaRPr sz="1800" b="1">
-              <a:solidFill>
-                <a:schemeClr val="accent1"/>
-              </a:solidFill>
-              <a:latin typeface="Lato"/>
-              <a:ea typeface="Lato"/>
-              <a:cs typeface="Lato"/>
-              <a:sym typeface="Lato"/>
-            </a:endParaRPr>
-          </a:p>
-          <a:p>
-            <a:pPr marL="0" lvl="0" indent="0" algn="l" rtl="0">
-              <a:lnSpc>
-                <a:spcPct val="80000"/>
-              </a:lnSpc>
-              <a:spcBef>
-                <a:spcPts val="820"/>
-              </a:spcBef>
-              <a:spcAft>
-                <a:spcPts val="0"/>
-              </a:spcAft>
-              <a:buNone/>
-            </a:pPr>
-            <a:r>
-              <a:rPr lang="en-US" sz="1800" b="1">
-                <a:solidFill>
-                  <a:schemeClr val="accent1"/>
-                </a:solidFill>
-                <a:latin typeface="Lato"/>
-                <a:ea typeface="Lato"/>
-                <a:cs typeface="Lato"/>
-                <a:sym typeface="Lato"/>
-              </a:rPr>
-              <a:t>After the meeting, there was an uneasy feeling about investing in a “Barbie Adventure Game”.   Did historical sales information support this claim, or is the CEO just going from his “gut feeling”?  As an analyst, the COO has assigned you a project to gather, store historical gaming console data.  Additionally, the COO would like to create an information dashboard that supports/refutes this claim, using market information you’ve been asked to gather.  </a:t>
-            </a:r>
-            <a:endParaRPr sz="1800" b="1">
-              <a:solidFill>
-                <a:schemeClr val="accent1"/>
-              </a:solidFill>
-              <a:latin typeface="Lato"/>
-              <a:ea typeface="Lato"/>
-              <a:cs typeface="Lato"/>
-              <a:sym typeface="Lato"/>
-            </a:endParaRPr>
-          </a:p>
-          <a:p>
-            <a:pPr marL="457200" lvl="0" indent="0" algn="l" rtl="0">
-              <a:lnSpc>
-                <a:spcPct val="80000"/>
-              </a:lnSpc>
-              <a:spcBef>
-                <a:spcPts val="820"/>
-              </a:spcBef>
-              <a:spcAft>
-                <a:spcPts val="0"/>
-              </a:spcAft>
-              <a:buNone/>
-            </a:pPr>
-            <a:endParaRPr sz="1800" b="1">
-              <a:solidFill>
-                <a:schemeClr val="accent1"/>
-              </a:solidFill>
-              <a:latin typeface="Lato"/>
-              <a:ea typeface="Lato"/>
-              <a:cs typeface="Lato"/>
-              <a:sym typeface="Lato"/>
-            </a:endParaRPr>
-          </a:p>
-          <a:p>
-            <a:pPr marL="457200" lvl="0" indent="0" algn="l" rtl="0">
-              <a:lnSpc>
-                <a:spcPct val="80000"/>
-              </a:lnSpc>
-              <a:spcBef>
-                <a:spcPts val="820"/>
-              </a:spcBef>
-              <a:spcAft>
-                <a:spcPts val="0"/>
-              </a:spcAft>
-              <a:buNone/>
-            </a:pPr>
-            <a:r>
-              <a:rPr lang="en-US" sz="1800" b="1">
-                <a:solidFill>
-                  <a:schemeClr val="accent1"/>
-                </a:solidFill>
-                <a:latin typeface="Lato"/>
-                <a:ea typeface="Lato"/>
-                <a:cs typeface="Lato"/>
-                <a:sym typeface="Lato"/>
-              </a:rPr>
-              <a:t>  </a:t>
-            </a:r>
-            <a:endParaRPr sz="1800" b="1">
-              <a:solidFill>
-                <a:schemeClr val="accent1"/>
-              </a:solidFill>
-              <a:latin typeface="Lato"/>
-              <a:ea typeface="Lato"/>
-              <a:cs typeface="Lato"/>
-              <a:sym typeface="Lato"/>
-            </a:endParaRPr>
-          </a:p>
-          <a:p>
-            <a:pPr marL="0" marR="0" lvl="0" indent="0" algn="l" rtl="0">
-              <a:lnSpc>
-                <a:spcPct val="80000"/>
-              </a:lnSpc>
-              <a:spcBef>
-                <a:spcPts val="820"/>
-              </a:spcBef>
-              <a:spcAft>
-                <a:spcPts val="0"/>
-              </a:spcAft>
-              <a:buNone/>
-            </a:pPr>
-            <a:endParaRPr/>
-          </a:p>
-        </p:txBody>
-      </p:sp>
-      <p:sp>
-        <p:nvSpPr>
-          <p:cNvPr id="218" name="Google Shape;218;p33"/>
-          <p:cNvSpPr txBox="1"/>
-          <p:nvPr/>
-        </p:nvSpPr>
-        <p:spPr>
-          <a:xfrm>
-            <a:off x="1019150" y="4556600"/>
-            <a:ext cx="5205600" cy="700800"/>
-          </a:xfrm>
-          <a:prstGeom prst="rect">
-            <a:avLst/>
-          </a:prstGeom>
-          <a:noFill/>
-          <a:ln>
-            <a:noFill/>
-          </a:ln>
-        </p:spPr>
-        <p:txBody>
-          <a:bodyPr spcFirstLastPara="1" wrap="square" lIns="91425" tIns="91425" rIns="91425" bIns="91425" anchor="t" anchorCtr="0">
-            <a:noAutofit/>
-          </a:bodyPr>
-          <a:lstStyle/>
-          <a:p>
-            <a:pPr marL="0" lvl="0" indent="0" algn="l" rtl="0">
-              <a:lnSpc>
-                <a:spcPct val="80000"/>
-              </a:lnSpc>
-              <a:spcBef>
-                <a:spcPts val="820"/>
-              </a:spcBef>
-              <a:spcAft>
-                <a:spcPts val="0"/>
-              </a:spcAft>
-              <a:buNone/>
-            </a:pPr>
-            <a:r>
-              <a:rPr lang="en-US" sz="1800" b="1" u="sng">
-                <a:solidFill>
-                  <a:schemeClr val="accent1"/>
-                </a:solidFill>
-                <a:latin typeface="Lato"/>
-                <a:ea typeface="Lato"/>
-                <a:cs typeface="Lato"/>
-                <a:sym typeface="Lato"/>
-              </a:rPr>
-              <a:t>Project Goal(s)</a:t>
-            </a:r>
-            <a:r>
-              <a:rPr lang="en-US" sz="1800" b="1">
-                <a:solidFill>
-                  <a:schemeClr val="accent1"/>
-                </a:solidFill>
-                <a:latin typeface="Lato"/>
-                <a:ea typeface="Lato"/>
-                <a:cs typeface="Lato"/>
-                <a:sym typeface="Lato"/>
-              </a:rPr>
-              <a:t>:  </a:t>
-            </a:r>
-            <a:endParaRPr sz="1800" b="1">
-              <a:solidFill>
-                <a:schemeClr val="accent1"/>
-              </a:solidFill>
-              <a:latin typeface="Lato"/>
-              <a:ea typeface="Lato"/>
-              <a:cs typeface="Lato"/>
-              <a:sym typeface="Lato"/>
-            </a:endParaRPr>
-          </a:p>
-          <a:p>
-            <a:pPr marL="457200" lvl="0" indent="-342900" algn="l" rtl="0">
-              <a:lnSpc>
-                <a:spcPct val="80000"/>
-              </a:lnSpc>
-              <a:spcBef>
-                <a:spcPts val="820"/>
-              </a:spcBef>
-              <a:spcAft>
-                <a:spcPts val="0"/>
-              </a:spcAft>
-              <a:buClr>
-                <a:schemeClr val="accent1"/>
-              </a:buClr>
-              <a:buSzPts val="1800"/>
-              <a:buFont typeface="Lato"/>
-              <a:buAutoNum type="arabicParenR"/>
-            </a:pPr>
-            <a:r>
-              <a:rPr lang="en-US" sz="1800" b="1">
-                <a:solidFill>
-                  <a:schemeClr val="accent1"/>
-                </a:solidFill>
-                <a:latin typeface="Lato"/>
-                <a:ea typeface="Lato"/>
-                <a:cs typeface="Lato"/>
-                <a:sym typeface="Lato"/>
-              </a:rPr>
-              <a:t>Create a dynamic information dashboard that provides senior management insight into the video game console market. </a:t>
-            </a:r>
-            <a:endParaRPr sz="1800" b="1">
-              <a:solidFill>
-                <a:schemeClr val="accent1"/>
-              </a:solidFill>
-              <a:latin typeface="Lato"/>
-              <a:ea typeface="Lato"/>
-              <a:cs typeface="Lato"/>
-              <a:sym typeface="Lato"/>
-            </a:endParaRPr>
-          </a:p>
-          <a:p>
-            <a:pPr marL="457200" lvl="0" indent="0" algn="l" rtl="0">
-              <a:lnSpc>
-                <a:spcPct val="80000"/>
-              </a:lnSpc>
-              <a:spcBef>
-                <a:spcPts val="820"/>
-              </a:spcBef>
-              <a:spcAft>
-                <a:spcPts val="0"/>
-              </a:spcAft>
-              <a:buNone/>
-            </a:pPr>
-            <a:endParaRPr sz="1800" b="1">
-              <a:solidFill>
-                <a:schemeClr val="accent1"/>
-              </a:solidFill>
-              <a:latin typeface="Lato"/>
-              <a:ea typeface="Lato"/>
-              <a:cs typeface="Lato"/>
-              <a:sym typeface="Lato"/>
-            </a:endParaRPr>
-          </a:p>
-          <a:p>
-            <a:pPr marL="457200" lvl="0" indent="-342900" algn="l" rtl="0">
-              <a:lnSpc>
-                <a:spcPct val="80000"/>
-              </a:lnSpc>
-              <a:spcBef>
-                <a:spcPts val="820"/>
-              </a:spcBef>
-              <a:spcAft>
-                <a:spcPts val="0"/>
-              </a:spcAft>
-              <a:buClr>
-                <a:schemeClr val="accent1"/>
-              </a:buClr>
-              <a:buSzPts val="1800"/>
-              <a:buFont typeface="Lato"/>
-              <a:buAutoNum type="arabicParenR"/>
-            </a:pPr>
-            <a:r>
-              <a:rPr lang="en-US" sz="1800" b="1">
-                <a:solidFill>
-                  <a:schemeClr val="accent1"/>
-                </a:solidFill>
-                <a:latin typeface="Lato"/>
-                <a:ea typeface="Lato"/>
-                <a:cs typeface="Lato"/>
-                <a:sym typeface="Lato"/>
-              </a:rPr>
-              <a:t>Create data structures that allow for the automated storage of future console/game information.   </a:t>
-            </a:r>
-            <a:endParaRPr sz="1800" b="1">
-              <a:solidFill>
-                <a:schemeClr val="accent1"/>
-              </a:solidFill>
-              <a:latin typeface="Lato"/>
-              <a:ea typeface="Lato"/>
-              <a:cs typeface="Lato"/>
-              <a:sym typeface="Lato"/>
-            </a:endParaRPr>
-          </a:p>
-          <a:p>
-            <a:pPr marL="0" marR="0" lvl="0" indent="0" algn="l" rtl="0">
-              <a:lnSpc>
-                <a:spcPct val="80000"/>
-              </a:lnSpc>
-              <a:spcBef>
-                <a:spcPts val="820"/>
-              </a:spcBef>
-              <a:spcAft>
-                <a:spcPts val="0"/>
-              </a:spcAft>
-              <a:buNone/>
-            </a:pPr>
-            <a:endParaRPr/>
-          </a:p>
-        </p:txBody>
-      </p:sp>
     </p:spTree>
   </p:cSld>
   <p:clrMapOvr>

</xml_diff>